<commit_message>
Updated README, dataflow diagram
</commit_message>
<xml_diff>
--- a/extras/media/dataflow.pptx
+++ b/extras/media/dataflow.pptx
@@ -1,19 +1,114 @@
 
 <file path=ppt/presentation.xml><?xml version="1.0" encoding="utf-8"?>
-<p:presentation xmlns:a="http://schemas.openxmlformats.org/drawingml/2006/main" xmlns:p="http://schemas.openxmlformats.org/presentationml/2006/main" xmlns:r="http://schemas.openxmlformats.org/officeDocument/2006/relationships" xmlns:p14="http://schemas.microsoft.com/office/powerpoint/2010/main" xmlns:p15="http://schemas.microsoft.com/office/powerpoint/2012/main" xmlns:mc="http://schemas.openxmlformats.org/markup-compatibility/2006">
+<p:presentation xmlns:a="http://schemas.openxmlformats.org/drawingml/2006/main" xmlns:r="http://schemas.openxmlformats.org/officeDocument/2006/relationships" xmlns:p="http://schemas.openxmlformats.org/presentationml/2006/main">
   <p:sldMasterIdLst>
-    <p:sldMasterId id="2147483648" r:id="rId2"/>
+    <p:sldMasterId id="2147483648" r:id="rId1"/>
   </p:sldMasterIdLst>
   <p:sldIdLst>
-    <p:sldId id="256" r:id="rId3"/>
+    <p:sldId id="256" r:id="rId2"/>
   </p:sldIdLst>
   <p:sldSz cx="10080625" cy="7559675"/>
   <p:notesSz cx="7772400" cy="10058400"/>
+  <p:defaultTextStyle>
+    <a:defPPr>
+      <a:defRPr lang="en-US"/>
+    </a:defPPr>
+    <a:lvl1pPr marL="0" algn="l" defTabSz="914400" rtl="0" eaLnBrk="1" latinLnBrk="0" hangingPunct="1">
+      <a:defRPr sz="1800" kern="1200">
+        <a:solidFill>
+          <a:schemeClr val="tx1"/>
+        </a:solidFill>
+        <a:latin typeface="+mn-lt"/>
+        <a:ea typeface="+mn-ea"/>
+        <a:cs typeface="+mn-cs"/>
+      </a:defRPr>
+    </a:lvl1pPr>
+    <a:lvl2pPr marL="457200" algn="l" defTabSz="914400" rtl="0" eaLnBrk="1" latinLnBrk="0" hangingPunct="1">
+      <a:defRPr sz="1800" kern="1200">
+        <a:solidFill>
+          <a:schemeClr val="tx1"/>
+        </a:solidFill>
+        <a:latin typeface="+mn-lt"/>
+        <a:ea typeface="+mn-ea"/>
+        <a:cs typeface="+mn-cs"/>
+      </a:defRPr>
+    </a:lvl2pPr>
+    <a:lvl3pPr marL="914400" algn="l" defTabSz="914400" rtl="0" eaLnBrk="1" latinLnBrk="0" hangingPunct="1">
+      <a:defRPr sz="1800" kern="1200">
+        <a:solidFill>
+          <a:schemeClr val="tx1"/>
+        </a:solidFill>
+        <a:latin typeface="+mn-lt"/>
+        <a:ea typeface="+mn-ea"/>
+        <a:cs typeface="+mn-cs"/>
+      </a:defRPr>
+    </a:lvl3pPr>
+    <a:lvl4pPr marL="1371600" algn="l" defTabSz="914400" rtl="0" eaLnBrk="1" latinLnBrk="0" hangingPunct="1">
+      <a:defRPr sz="1800" kern="1200">
+        <a:solidFill>
+          <a:schemeClr val="tx1"/>
+        </a:solidFill>
+        <a:latin typeface="+mn-lt"/>
+        <a:ea typeface="+mn-ea"/>
+        <a:cs typeface="+mn-cs"/>
+      </a:defRPr>
+    </a:lvl4pPr>
+    <a:lvl5pPr marL="1828800" algn="l" defTabSz="914400" rtl="0" eaLnBrk="1" latinLnBrk="0" hangingPunct="1">
+      <a:defRPr sz="1800" kern="1200">
+        <a:solidFill>
+          <a:schemeClr val="tx1"/>
+        </a:solidFill>
+        <a:latin typeface="+mn-lt"/>
+        <a:ea typeface="+mn-ea"/>
+        <a:cs typeface="+mn-cs"/>
+      </a:defRPr>
+    </a:lvl5pPr>
+    <a:lvl6pPr marL="2286000" algn="l" defTabSz="914400" rtl="0" eaLnBrk="1" latinLnBrk="0" hangingPunct="1">
+      <a:defRPr sz="1800" kern="1200">
+        <a:solidFill>
+          <a:schemeClr val="tx1"/>
+        </a:solidFill>
+        <a:latin typeface="+mn-lt"/>
+        <a:ea typeface="+mn-ea"/>
+        <a:cs typeface="+mn-cs"/>
+      </a:defRPr>
+    </a:lvl6pPr>
+    <a:lvl7pPr marL="2743200" algn="l" defTabSz="914400" rtl="0" eaLnBrk="1" latinLnBrk="0" hangingPunct="1">
+      <a:defRPr sz="1800" kern="1200">
+        <a:solidFill>
+          <a:schemeClr val="tx1"/>
+        </a:solidFill>
+        <a:latin typeface="+mn-lt"/>
+        <a:ea typeface="+mn-ea"/>
+        <a:cs typeface="+mn-cs"/>
+      </a:defRPr>
+    </a:lvl7pPr>
+    <a:lvl8pPr marL="3200400" algn="l" defTabSz="914400" rtl="0" eaLnBrk="1" latinLnBrk="0" hangingPunct="1">
+      <a:defRPr sz="1800" kern="1200">
+        <a:solidFill>
+          <a:schemeClr val="tx1"/>
+        </a:solidFill>
+        <a:latin typeface="+mn-lt"/>
+        <a:ea typeface="+mn-ea"/>
+        <a:cs typeface="+mn-cs"/>
+      </a:defRPr>
+    </a:lvl8pPr>
+    <a:lvl9pPr marL="3657600" algn="l" defTabSz="914400" rtl="0" eaLnBrk="1" latinLnBrk="0" hangingPunct="1">
+      <a:defRPr sz="1800" kern="1200">
+        <a:solidFill>
+          <a:schemeClr val="tx1"/>
+        </a:solidFill>
+        <a:latin typeface="+mn-lt"/>
+        <a:ea typeface="+mn-ea"/>
+        <a:cs typeface="+mn-cs"/>
+      </a:defRPr>
+    </a:lvl9pPr>
+  </p:defaultTextStyle>
 </p:presentation>
 </file>
 
 <file path=ppt/slideLayouts/slideLayout1.xml><?xml version="1.0" encoding="utf-8"?>
-<p:sldLayout xmlns:a="http://schemas.openxmlformats.org/drawingml/2006/main" xmlns:p="http://schemas.openxmlformats.org/presentationml/2006/main" xmlns:r="http://schemas.openxmlformats.org/officeDocument/2006/relationships" xmlns:p14="http://schemas.microsoft.com/office/powerpoint/2010/main" xmlns:p15="http://schemas.microsoft.com/office/powerpoint/2012/main" xmlns:mc="http://schemas.openxmlformats.org/markup-compatibility/2006" type="blank" preserve="1">
+<p:sldLayout xmlns:a="http://schemas.openxmlformats.org/drawingml/2006/main" xmlns:r="http://schemas.openxmlformats.org/officeDocument/2006/relationships" xmlns:p="http://schemas.openxmlformats.org/presentationml/2006/main" type="blank" preserve="1">
   <p:cSld name="Blank Slide">
     <p:spTree>
       <p:nvGrpSpPr>
@@ -31,11 +126,14 @@
       </p:grpSpPr>
     </p:spTree>
   </p:cSld>
+  <p:clrMapOvr>
+    <a:masterClrMapping/>
+  </p:clrMapOvr>
 </p:sldLayout>
 </file>
 
 <file path=ppt/slideLayouts/slideLayout10.xml><?xml version="1.0" encoding="utf-8"?>
-<p:sldLayout xmlns:a="http://schemas.openxmlformats.org/drawingml/2006/main" xmlns:p="http://schemas.openxmlformats.org/presentationml/2006/main" xmlns:r="http://schemas.openxmlformats.org/officeDocument/2006/relationships" xmlns:p14="http://schemas.microsoft.com/office/powerpoint/2010/main" xmlns:p15="http://schemas.microsoft.com/office/powerpoint/2012/main" xmlns:mc="http://schemas.openxmlformats.org/markup-compatibility/2006" type="objOverTx" preserve="1">
+<p:sldLayout xmlns:a="http://schemas.openxmlformats.org/drawingml/2006/main" xmlns:r="http://schemas.openxmlformats.org/officeDocument/2006/relationships" xmlns:p="http://schemas.openxmlformats.org/presentationml/2006/main" type="objOverTx" preserve="1">
   <p:cSld name="Title, Content over Content">
     <p:spTree>
       <p:nvGrpSpPr>
@@ -71,9 +169,10 @@
           </a:prstGeom>
         </p:spPr>
         <p:txBody>
-          <a:bodyPr lIns="0" rIns="0" tIns="0" bIns="0" anchor="ctr"/>
-          <a:p>
-            <a:endParaRPr b="0" lang="en-US" sz="1800" spc="-1" strike="noStrike">
+          <a:bodyPr lIns="0" tIns="0" rIns="0" bIns="0" anchor="ctr"/>
+          <a:lstStyle/>
+          <a:p>
+            <a:endParaRPr lang="en-US" sz="1800" b="0" strike="noStrike" spc="-1">
               <a:solidFill>
                 <a:srgbClr val="000000"/>
               </a:solidFill>
@@ -102,11 +201,12 @@
           </a:prstGeom>
         </p:spPr>
         <p:txBody>
-          <a:bodyPr lIns="0" rIns="0" tIns="0" bIns="0">
+          <a:bodyPr lIns="0" tIns="0" rIns="0" bIns="0">
             <a:normAutofit/>
           </a:bodyPr>
-          <a:p>
-            <a:endParaRPr b="0" lang="en-US" sz="2800" spc="-1" strike="noStrike">
+          <a:lstStyle/>
+          <a:p>
+            <a:endParaRPr lang="en-US" sz="2800" b="0" strike="noStrike" spc="-1">
               <a:solidFill>
                 <a:srgbClr val="000000"/>
               </a:solidFill>
@@ -135,11 +235,12 @@
           </a:prstGeom>
         </p:spPr>
         <p:txBody>
-          <a:bodyPr lIns="0" rIns="0" tIns="0" bIns="0">
+          <a:bodyPr lIns="0" tIns="0" rIns="0" bIns="0">
             <a:normAutofit/>
           </a:bodyPr>
-          <a:p>
-            <a:endParaRPr b="0" lang="en-US" sz="2800" spc="-1" strike="noStrike">
+          <a:lstStyle/>
+          <a:p>
+            <a:endParaRPr lang="en-US" sz="2800" b="0" strike="noStrike" spc="-1">
               <a:solidFill>
                 <a:srgbClr val="000000"/>
               </a:solidFill>
@@ -150,11 +251,14 @@
       </p:sp>
     </p:spTree>
   </p:cSld>
+  <p:clrMapOvr>
+    <a:masterClrMapping/>
+  </p:clrMapOvr>
 </p:sldLayout>
 </file>
 
 <file path=ppt/slideLayouts/slideLayout11.xml><?xml version="1.0" encoding="utf-8"?>
-<p:sldLayout xmlns:a="http://schemas.openxmlformats.org/drawingml/2006/main" xmlns:p="http://schemas.openxmlformats.org/presentationml/2006/main" xmlns:r="http://schemas.openxmlformats.org/officeDocument/2006/relationships" xmlns:p14="http://schemas.microsoft.com/office/powerpoint/2010/main" xmlns:p15="http://schemas.microsoft.com/office/powerpoint/2012/main" xmlns:mc="http://schemas.openxmlformats.org/markup-compatibility/2006" type="fourObj" preserve="1">
+<p:sldLayout xmlns:a="http://schemas.openxmlformats.org/drawingml/2006/main" xmlns:r="http://schemas.openxmlformats.org/officeDocument/2006/relationships" xmlns:p="http://schemas.openxmlformats.org/presentationml/2006/main" type="fourObj" preserve="1">
   <p:cSld name="Title, 4 Content">
     <p:spTree>
       <p:nvGrpSpPr>
@@ -190,9 +294,10 @@
           </a:prstGeom>
         </p:spPr>
         <p:txBody>
-          <a:bodyPr lIns="0" rIns="0" tIns="0" bIns="0" anchor="ctr"/>
-          <a:p>
-            <a:endParaRPr b="0" lang="en-US" sz="1800" spc="-1" strike="noStrike">
+          <a:bodyPr lIns="0" tIns="0" rIns="0" bIns="0" anchor="ctr"/>
+          <a:lstStyle/>
+          <a:p>
+            <a:endParaRPr lang="en-US" sz="1800" b="0" strike="noStrike" spc="-1">
               <a:solidFill>
                 <a:srgbClr val="000000"/>
               </a:solidFill>
@@ -221,11 +326,12 @@
           </a:prstGeom>
         </p:spPr>
         <p:txBody>
-          <a:bodyPr lIns="0" rIns="0" tIns="0" bIns="0">
+          <a:bodyPr lIns="0" tIns="0" rIns="0" bIns="0">
             <a:normAutofit/>
           </a:bodyPr>
-          <a:p>
-            <a:endParaRPr b="0" lang="en-US" sz="2800" spc="-1" strike="noStrike">
+          <a:lstStyle/>
+          <a:p>
+            <a:endParaRPr lang="en-US" sz="2800" b="0" strike="noStrike" spc="-1">
               <a:solidFill>
                 <a:srgbClr val="000000"/>
               </a:solidFill>
@@ -254,11 +360,12 @@
           </a:prstGeom>
         </p:spPr>
         <p:txBody>
-          <a:bodyPr lIns="0" rIns="0" tIns="0" bIns="0">
+          <a:bodyPr lIns="0" tIns="0" rIns="0" bIns="0">
             <a:normAutofit/>
           </a:bodyPr>
-          <a:p>
-            <a:endParaRPr b="0" lang="en-US" sz="2800" spc="-1" strike="noStrike">
+          <a:lstStyle/>
+          <a:p>
+            <a:endParaRPr lang="en-US" sz="2800" b="0" strike="noStrike" spc="-1">
               <a:solidFill>
                 <a:srgbClr val="000000"/>
               </a:solidFill>
@@ -287,11 +394,12 @@
           </a:prstGeom>
         </p:spPr>
         <p:txBody>
-          <a:bodyPr lIns="0" rIns="0" tIns="0" bIns="0">
+          <a:bodyPr lIns="0" tIns="0" rIns="0" bIns="0">
             <a:normAutofit/>
           </a:bodyPr>
-          <a:p>
-            <a:endParaRPr b="0" lang="en-US" sz="2800" spc="-1" strike="noStrike">
+          <a:lstStyle/>
+          <a:p>
+            <a:endParaRPr lang="en-US" sz="2800" b="0" strike="noStrike" spc="-1">
               <a:solidFill>
                 <a:srgbClr val="000000"/>
               </a:solidFill>
@@ -320,11 +428,12 @@
           </a:prstGeom>
         </p:spPr>
         <p:txBody>
-          <a:bodyPr lIns="0" rIns="0" tIns="0" bIns="0">
+          <a:bodyPr lIns="0" tIns="0" rIns="0" bIns="0">
             <a:normAutofit/>
           </a:bodyPr>
-          <a:p>
-            <a:endParaRPr b="0" lang="en-US" sz="2800" spc="-1" strike="noStrike">
+          <a:lstStyle/>
+          <a:p>
+            <a:endParaRPr lang="en-US" sz="2800" b="0" strike="noStrike" spc="-1">
               <a:solidFill>
                 <a:srgbClr val="000000"/>
               </a:solidFill>
@@ -335,11 +444,14 @@
       </p:sp>
     </p:spTree>
   </p:cSld>
+  <p:clrMapOvr>
+    <a:masterClrMapping/>
+  </p:clrMapOvr>
 </p:sldLayout>
 </file>
 
 <file path=ppt/slideLayouts/slideLayout12.xml><?xml version="1.0" encoding="utf-8"?>
-<p:sldLayout xmlns:a="http://schemas.openxmlformats.org/drawingml/2006/main" xmlns:p="http://schemas.openxmlformats.org/presentationml/2006/main" xmlns:r="http://schemas.openxmlformats.org/officeDocument/2006/relationships" xmlns:p14="http://schemas.microsoft.com/office/powerpoint/2010/main" xmlns:p15="http://schemas.microsoft.com/office/powerpoint/2012/main" xmlns:mc="http://schemas.openxmlformats.org/markup-compatibility/2006" type="blank" preserve="1">
+<p:sldLayout xmlns:a="http://schemas.openxmlformats.org/drawingml/2006/main" xmlns:r="http://schemas.openxmlformats.org/officeDocument/2006/relationships" xmlns:p="http://schemas.openxmlformats.org/presentationml/2006/main" type="blank" preserve="1">
   <p:cSld name="Title, 6 Content">
     <p:spTree>
       <p:nvGrpSpPr>
@@ -375,9 +487,10 @@
           </a:prstGeom>
         </p:spPr>
         <p:txBody>
-          <a:bodyPr lIns="0" rIns="0" tIns="0" bIns="0" anchor="ctr"/>
-          <a:p>
-            <a:endParaRPr b="0" lang="en-US" sz="1800" spc="-1" strike="noStrike">
+          <a:bodyPr lIns="0" tIns="0" rIns="0" bIns="0" anchor="ctr"/>
+          <a:lstStyle/>
+          <a:p>
+            <a:endParaRPr lang="en-US" sz="1800" b="0" strike="noStrike" spc="-1">
               <a:solidFill>
                 <a:srgbClr val="000000"/>
               </a:solidFill>
@@ -406,11 +519,12 @@
           </a:prstGeom>
         </p:spPr>
         <p:txBody>
-          <a:bodyPr lIns="0" rIns="0" tIns="0" bIns="0">
+          <a:bodyPr lIns="0" tIns="0" rIns="0" bIns="0">
             <a:normAutofit/>
           </a:bodyPr>
-          <a:p>
-            <a:endParaRPr b="0" lang="en-US" sz="2800" spc="-1" strike="noStrike">
+          <a:lstStyle/>
+          <a:p>
+            <a:endParaRPr lang="en-US" sz="2800" b="0" strike="noStrike" spc="-1">
               <a:solidFill>
                 <a:srgbClr val="000000"/>
               </a:solidFill>
@@ -439,11 +553,12 @@
           </a:prstGeom>
         </p:spPr>
         <p:txBody>
-          <a:bodyPr lIns="0" rIns="0" tIns="0" bIns="0">
+          <a:bodyPr lIns="0" tIns="0" rIns="0" bIns="0">
             <a:normAutofit/>
           </a:bodyPr>
-          <a:p>
-            <a:endParaRPr b="0" lang="en-US" sz="2800" spc="-1" strike="noStrike">
+          <a:lstStyle/>
+          <a:p>
+            <a:endParaRPr lang="en-US" sz="2800" b="0" strike="noStrike" spc="-1">
               <a:solidFill>
                 <a:srgbClr val="000000"/>
               </a:solidFill>
@@ -472,11 +587,12 @@
           </a:prstGeom>
         </p:spPr>
         <p:txBody>
-          <a:bodyPr lIns="0" rIns="0" tIns="0" bIns="0">
+          <a:bodyPr lIns="0" tIns="0" rIns="0" bIns="0">
             <a:normAutofit/>
           </a:bodyPr>
-          <a:p>
-            <a:endParaRPr b="0" lang="en-US" sz="2800" spc="-1" strike="noStrike">
+          <a:lstStyle/>
+          <a:p>
+            <a:endParaRPr lang="en-US" sz="2800" b="0" strike="noStrike" spc="-1">
               <a:solidFill>
                 <a:srgbClr val="000000"/>
               </a:solidFill>
@@ -505,11 +621,12 @@
           </a:prstGeom>
         </p:spPr>
         <p:txBody>
-          <a:bodyPr lIns="0" rIns="0" tIns="0" bIns="0">
+          <a:bodyPr lIns="0" tIns="0" rIns="0" bIns="0">
             <a:normAutofit/>
           </a:bodyPr>
-          <a:p>
-            <a:endParaRPr b="0" lang="en-US" sz="2800" spc="-1" strike="noStrike">
+          <a:lstStyle/>
+          <a:p>
+            <a:endParaRPr lang="en-US" sz="2800" b="0" strike="noStrike" spc="-1">
               <a:solidFill>
                 <a:srgbClr val="000000"/>
               </a:solidFill>
@@ -538,11 +655,12 @@
           </a:prstGeom>
         </p:spPr>
         <p:txBody>
-          <a:bodyPr lIns="0" rIns="0" tIns="0" bIns="0">
+          <a:bodyPr lIns="0" tIns="0" rIns="0" bIns="0">
             <a:normAutofit/>
           </a:bodyPr>
-          <a:p>
-            <a:endParaRPr b="0" lang="en-US" sz="2800" spc="-1" strike="noStrike">
+          <a:lstStyle/>
+          <a:p>
+            <a:endParaRPr lang="en-US" sz="2800" b="0" strike="noStrike" spc="-1">
               <a:solidFill>
                 <a:srgbClr val="000000"/>
               </a:solidFill>
@@ -571,11 +689,12 @@
           </a:prstGeom>
         </p:spPr>
         <p:txBody>
-          <a:bodyPr lIns="0" rIns="0" tIns="0" bIns="0">
+          <a:bodyPr lIns="0" tIns="0" rIns="0" bIns="0">
             <a:normAutofit/>
           </a:bodyPr>
-          <a:p>
-            <a:endParaRPr b="0" lang="en-US" sz="2800" spc="-1" strike="noStrike">
+          <a:lstStyle/>
+          <a:p>
+            <a:endParaRPr lang="en-US" sz="2800" b="0" strike="noStrike" spc="-1">
               <a:solidFill>
                 <a:srgbClr val="000000"/>
               </a:solidFill>
@@ -586,11 +705,14 @@
       </p:sp>
     </p:spTree>
   </p:cSld>
+  <p:clrMapOvr>
+    <a:masterClrMapping/>
+  </p:clrMapOvr>
 </p:sldLayout>
 </file>
 
 <file path=ppt/slideLayouts/slideLayout2.xml><?xml version="1.0" encoding="utf-8"?>
-<p:sldLayout xmlns:a="http://schemas.openxmlformats.org/drawingml/2006/main" xmlns:p="http://schemas.openxmlformats.org/presentationml/2006/main" xmlns:r="http://schemas.openxmlformats.org/officeDocument/2006/relationships" xmlns:p14="http://schemas.microsoft.com/office/powerpoint/2010/main" xmlns:p15="http://schemas.microsoft.com/office/powerpoint/2012/main" xmlns:mc="http://schemas.openxmlformats.org/markup-compatibility/2006" type="tx" preserve="1">
+<p:sldLayout xmlns:a="http://schemas.openxmlformats.org/drawingml/2006/main" xmlns:r="http://schemas.openxmlformats.org/officeDocument/2006/relationships" xmlns:p="http://schemas.openxmlformats.org/presentationml/2006/main" type="tx" preserve="1">
   <p:cSld name="Title Slide">
     <p:spTree>
       <p:nvGrpSpPr>
@@ -626,9 +748,10 @@
           </a:prstGeom>
         </p:spPr>
         <p:txBody>
-          <a:bodyPr lIns="0" rIns="0" tIns="0" bIns="0" anchor="ctr"/>
-          <a:p>
-            <a:endParaRPr b="0" lang="en-US" sz="1800" spc="-1" strike="noStrike">
+          <a:bodyPr lIns="0" tIns="0" rIns="0" bIns="0" anchor="ctr"/>
+          <a:lstStyle/>
+          <a:p>
+            <a:endParaRPr lang="en-US" sz="1800" b="0" strike="noStrike" spc="-1">
               <a:solidFill>
                 <a:srgbClr val="000000"/>
               </a:solidFill>
@@ -657,10 +780,11 @@
           </a:prstGeom>
         </p:spPr>
         <p:txBody>
-          <a:bodyPr lIns="0" rIns="0" tIns="0" bIns="0" anchor="ctr"/>
+          <a:bodyPr lIns="0" tIns="0" rIns="0" bIns="0" anchor="ctr"/>
+          <a:lstStyle/>
           <a:p>
             <a:pPr algn="ctr"/>
-            <a:endParaRPr b="0" lang="en-US" sz="3200" spc="-1" strike="noStrike">
+            <a:endParaRPr lang="en-US" sz="3200" b="0" strike="noStrike" spc="-1">
               <a:latin typeface="Arial"/>
             </a:endParaRPr>
           </a:p>
@@ -668,11 +792,14 @@
       </p:sp>
     </p:spTree>
   </p:cSld>
+  <p:clrMapOvr>
+    <a:masterClrMapping/>
+  </p:clrMapOvr>
 </p:sldLayout>
 </file>
 
 <file path=ppt/slideLayouts/slideLayout3.xml><?xml version="1.0" encoding="utf-8"?>
-<p:sldLayout xmlns:a="http://schemas.openxmlformats.org/drawingml/2006/main" xmlns:p="http://schemas.openxmlformats.org/presentationml/2006/main" xmlns:r="http://schemas.openxmlformats.org/officeDocument/2006/relationships" xmlns:p14="http://schemas.microsoft.com/office/powerpoint/2010/main" xmlns:p15="http://schemas.microsoft.com/office/powerpoint/2012/main" xmlns:mc="http://schemas.openxmlformats.org/markup-compatibility/2006" type="obj" preserve="1">
+<p:sldLayout xmlns:a="http://schemas.openxmlformats.org/drawingml/2006/main" xmlns:r="http://schemas.openxmlformats.org/officeDocument/2006/relationships" xmlns:p="http://schemas.openxmlformats.org/presentationml/2006/main" type="obj" preserve="1">
   <p:cSld name="Title, Content">
     <p:spTree>
       <p:nvGrpSpPr>
@@ -708,9 +835,10 @@
           </a:prstGeom>
         </p:spPr>
         <p:txBody>
-          <a:bodyPr lIns="0" rIns="0" tIns="0" bIns="0" anchor="ctr"/>
-          <a:p>
-            <a:endParaRPr b="0" lang="en-US" sz="1800" spc="-1" strike="noStrike">
+          <a:bodyPr lIns="0" tIns="0" rIns="0" bIns="0" anchor="ctr"/>
+          <a:lstStyle/>
+          <a:p>
+            <a:endParaRPr lang="en-US" sz="1800" b="0" strike="noStrike" spc="-1">
               <a:solidFill>
                 <a:srgbClr val="000000"/>
               </a:solidFill>
@@ -739,11 +867,12 @@
           </a:prstGeom>
         </p:spPr>
         <p:txBody>
-          <a:bodyPr lIns="0" rIns="0" tIns="0" bIns="0">
+          <a:bodyPr lIns="0" tIns="0" rIns="0" bIns="0">
             <a:normAutofit/>
           </a:bodyPr>
-          <a:p>
-            <a:endParaRPr b="0" lang="en-US" sz="2800" spc="-1" strike="noStrike">
+          <a:lstStyle/>
+          <a:p>
+            <a:endParaRPr lang="en-US" sz="2800" b="0" strike="noStrike" spc="-1">
               <a:solidFill>
                 <a:srgbClr val="000000"/>
               </a:solidFill>
@@ -754,11 +883,14 @@
       </p:sp>
     </p:spTree>
   </p:cSld>
+  <p:clrMapOvr>
+    <a:masterClrMapping/>
+  </p:clrMapOvr>
 </p:sldLayout>
 </file>
 
 <file path=ppt/slideLayouts/slideLayout4.xml><?xml version="1.0" encoding="utf-8"?>
-<p:sldLayout xmlns:a="http://schemas.openxmlformats.org/drawingml/2006/main" xmlns:p="http://schemas.openxmlformats.org/presentationml/2006/main" xmlns:r="http://schemas.openxmlformats.org/officeDocument/2006/relationships" xmlns:p14="http://schemas.microsoft.com/office/powerpoint/2010/main" xmlns:p15="http://schemas.microsoft.com/office/powerpoint/2012/main" xmlns:mc="http://schemas.openxmlformats.org/markup-compatibility/2006" type="twoObj" preserve="1">
+<p:sldLayout xmlns:a="http://schemas.openxmlformats.org/drawingml/2006/main" xmlns:r="http://schemas.openxmlformats.org/officeDocument/2006/relationships" xmlns:p="http://schemas.openxmlformats.org/presentationml/2006/main" type="twoObj" preserve="1">
   <p:cSld name="Title, 2 Content">
     <p:spTree>
       <p:nvGrpSpPr>
@@ -794,9 +926,10 @@
           </a:prstGeom>
         </p:spPr>
         <p:txBody>
-          <a:bodyPr lIns="0" rIns="0" tIns="0" bIns="0" anchor="ctr"/>
-          <a:p>
-            <a:endParaRPr b="0" lang="en-US" sz="1800" spc="-1" strike="noStrike">
+          <a:bodyPr lIns="0" tIns="0" rIns="0" bIns="0" anchor="ctr"/>
+          <a:lstStyle/>
+          <a:p>
+            <a:endParaRPr lang="en-US" sz="1800" b="0" strike="noStrike" spc="-1">
               <a:solidFill>
                 <a:srgbClr val="000000"/>
               </a:solidFill>
@@ -825,11 +958,12 @@
           </a:prstGeom>
         </p:spPr>
         <p:txBody>
-          <a:bodyPr lIns="0" rIns="0" tIns="0" bIns="0">
+          <a:bodyPr lIns="0" tIns="0" rIns="0" bIns="0">
             <a:normAutofit/>
           </a:bodyPr>
-          <a:p>
-            <a:endParaRPr b="0" lang="en-US" sz="2800" spc="-1" strike="noStrike">
+          <a:lstStyle/>
+          <a:p>
+            <a:endParaRPr lang="en-US" sz="2800" b="0" strike="noStrike" spc="-1">
               <a:solidFill>
                 <a:srgbClr val="000000"/>
               </a:solidFill>
@@ -858,11 +992,12 @@
           </a:prstGeom>
         </p:spPr>
         <p:txBody>
-          <a:bodyPr lIns="0" rIns="0" tIns="0" bIns="0">
+          <a:bodyPr lIns="0" tIns="0" rIns="0" bIns="0">
             <a:normAutofit/>
           </a:bodyPr>
-          <a:p>
-            <a:endParaRPr b="0" lang="en-US" sz="2800" spc="-1" strike="noStrike">
+          <a:lstStyle/>
+          <a:p>
+            <a:endParaRPr lang="en-US" sz="2800" b="0" strike="noStrike" spc="-1">
               <a:solidFill>
                 <a:srgbClr val="000000"/>
               </a:solidFill>
@@ -873,11 +1008,14 @@
       </p:sp>
     </p:spTree>
   </p:cSld>
+  <p:clrMapOvr>
+    <a:masterClrMapping/>
+  </p:clrMapOvr>
 </p:sldLayout>
 </file>
 
 <file path=ppt/slideLayouts/slideLayout5.xml><?xml version="1.0" encoding="utf-8"?>
-<p:sldLayout xmlns:a="http://schemas.openxmlformats.org/drawingml/2006/main" xmlns:p="http://schemas.openxmlformats.org/presentationml/2006/main" xmlns:r="http://schemas.openxmlformats.org/officeDocument/2006/relationships" xmlns:p14="http://schemas.microsoft.com/office/powerpoint/2010/main" xmlns:p15="http://schemas.microsoft.com/office/powerpoint/2012/main" xmlns:mc="http://schemas.openxmlformats.org/markup-compatibility/2006" type="titleOnly" preserve="1">
+<p:sldLayout xmlns:a="http://schemas.openxmlformats.org/drawingml/2006/main" xmlns:r="http://schemas.openxmlformats.org/officeDocument/2006/relationships" xmlns:p="http://schemas.openxmlformats.org/presentationml/2006/main" type="titleOnly" preserve="1">
   <p:cSld name="Title Only">
     <p:spTree>
       <p:nvGrpSpPr>
@@ -913,9 +1051,10 @@
           </a:prstGeom>
         </p:spPr>
         <p:txBody>
-          <a:bodyPr lIns="0" rIns="0" tIns="0" bIns="0" anchor="ctr"/>
-          <a:p>
-            <a:endParaRPr b="0" lang="en-US" sz="1800" spc="-1" strike="noStrike">
+          <a:bodyPr lIns="0" tIns="0" rIns="0" bIns="0" anchor="ctr"/>
+          <a:lstStyle/>
+          <a:p>
+            <a:endParaRPr lang="en-US" sz="1800" b="0" strike="noStrike" spc="-1">
               <a:solidFill>
                 <a:srgbClr val="000000"/>
               </a:solidFill>
@@ -926,11 +1065,14 @@
       </p:sp>
     </p:spTree>
   </p:cSld>
+  <p:clrMapOvr>
+    <a:masterClrMapping/>
+  </p:clrMapOvr>
 </p:sldLayout>
 </file>
 
 <file path=ppt/slideLayouts/slideLayout6.xml><?xml version="1.0" encoding="utf-8"?>
-<p:sldLayout xmlns:a="http://schemas.openxmlformats.org/drawingml/2006/main" xmlns:p="http://schemas.openxmlformats.org/presentationml/2006/main" xmlns:r="http://schemas.openxmlformats.org/officeDocument/2006/relationships" xmlns:p14="http://schemas.microsoft.com/office/powerpoint/2010/main" xmlns:p15="http://schemas.microsoft.com/office/powerpoint/2012/main" xmlns:mc="http://schemas.openxmlformats.org/markup-compatibility/2006" type="objOnly" preserve="1">
+<p:sldLayout xmlns:a="http://schemas.openxmlformats.org/drawingml/2006/main" xmlns:r="http://schemas.openxmlformats.org/officeDocument/2006/relationships" xmlns:p="http://schemas.openxmlformats.org/presentationml/2006/main" type="objOnly" preserve="1">
   <p:cSld name="Centered Text">
     <p:spTree>
       <p:nvGrpSpPr>
@@ -966,10 +1108,11 @@
           </a:prstGeom>
         </p:spPr>
         <p:txBody>
-          <a:bodyPr lIns="0" rIns="0" tIns="0" bIns="0" anchor="ctr"/>
+          <a:bodyPr lIns="0" tIns="0" rIns="0" bIns="0" anchor="ctr"/>
+          <a:lstStyle/>
           <a:p>
             <a:pPr algn="ctr"/>
-            <a:endParaRPr b="0" lang="en-US" sz="3200" spc="-1" strike="noStrike">
+            <a:endParaRPr lang="en-US" sz="3200" b="0" strike="noStrike" spc="-1">
               <a:latin typeface="Arial"/>
             </a:endParaRPr>
           </a:p>
@@ -977,11 +1120,14 @@
       </p:sp>
     </p:spTree>
   </p:cSld>
+  <p:clrMapOvr>
+    <a:masterClrMapping/>
+  </p:clrMapOvr>
 </p:sldLayout>
 </file>
 
 <file path=ppt/slideLayouts/slideLayout7.xml><?xml version="1.0" encoding="utf-8"?>
-<p:sldLayout xmlns:a="http://schemas.openxmlformats.org/drawingml/2006/main" xmlns:p="http://schemas.openxmlformats.org/presentationml/2006/main" xmlns:r="http://schemas.openxmlformats.org/officeDocument/2006/relationships" xmlns:p14="http://schemas.microsoft.com/office/powerpoint/2010/main" xmlns:p15="http://schemas.microsoft.com/office/powerpoint/2012/main" xmlns:mc="http://schemas.openxmlformats.org/markup-compatibility/2006" type="twoObjAndObj" preserve="1">
+<p:sldLayout xmlns:a="http://schemas.openxmlformats.org/drawingml/2006/main" xmlns:r="http://schemas.openxmlformats.org/officeDocument/2006/relationships" xmlns:p="http://schemas.openxmlformats.org/presentationml/2006/main" type="twoObjAndObj" preserve="1">
   <p:cSld name="Title, 2 Content and Content">
     <p:spTree>
       <p:nvGrpSpPr>
@@ -1017,9 +1163,10 @@
           </a:prstGeom>
         </p:spPr>
         <p:txBody>
-          <a:bodyPr lIns="0" rIns="0" tIns="0" bIns="0" anchor="ctr"/>
-          <a:p>
-            <a:endParaRPr b="0" lang="en-US" sz="1800" spc="-1" strike="noStrike">
+          <a:bodyPr lIns="0" tIns="0" rIns="0" bIns="0" anchor="ctr"/>
+          <a:lstStyle/>
+          <a:p>
+            <a:endParaRPr lang="en-US" sz="1800" b="0" strike="noStrike" spc="-1">
               <a:solidFill>
                 <a:srgbClr val="000000"/>
               </a:solidFill>
@@ -1048,11 +1195,12 @@
           </a:prstGeom>
         </p:spPr>
         <p:txBody>
-          <a:bodyPr lIns="0" rIns="0" tIns="0" bIns="0">
+          <a:bodyPr lIns="0" tIns="0" rIns="0" bIns="0">
             <a:normAutofit/>
           </a:bodyPr>
-          <a:p>
-            <a:endParaRPr b="0" lang="en-US" sz="2800" spc="-1" strike="noStrike">
+          <a:lstStyle/>
+          <a:p>
+            <a:endParaRPr lang="en-US" sz="2800" b="0" strike="noStrike" spc="-1">
               <a:solidFill>
                 <a:srgbClr val="000000"/>
               </a:solidFill>
@@ -1081,11 +1229,12 @@
           </a:prstGeom>
         </p:spPr>
         <p:txBody>
-          <a:bodyPr lIns="0" rIns="0" tIns="0" bIns="0">
+          <a:bodyPr lIns="0" tIns="0" rIns="0" bIns="0">
             <a:normAutofit/>
           </a:bodyPr>
-          <a:p>
-            <a:endParaRPr b="0" lang="en-US" sz="2800" spc="-1" strike="noStrike">
+          <a:lstStyle/>
+          <a:p>
+            <a:endParaRPr lang="en-US" sz="2800" b="0" strike="noStrike" spc="-1">
               <a:solidFill>
                 <a:srgbClr val="000000"/>
               </a:solidFill>
@@ -1114,11 +1263,12 @@
           </a:prstGeom>
         </p:spPr>
         <p:txBody>
-          <a:bodyPr lIns="0" rIns="0" tIns="0" bIns="0">
+          <a:bodyPr lIns="0" tIns="0" rIns="0" bIns="0">
             <a:normAutofit/>
           </a:bodyPr>
-          <a:p>
-            <a:endParaRPr b="0" lang="en-US" sz="2800" spc="-1" strike="noStrike">
+          <a:lstStyle/>
+          <a:p>
+            <a:endParaRPr lang="en-US" sz="2800" b="0" strike="noStrike" spc="-1">
               <a:solidFill>
                 <a:srgbClr val="000000"/>
               </a:solidFill>
@@ -1129,11 +1279,14 @@
       </p:sp>
     </p:spTree>
   </p:cSld>
+  <p:clrMapOvr>
+    <a:masterClrMapping/>
+  </p:clrMapOvr>
 </p:sldLayout>
 </file>
 
 <file path=ppt/slideLayouts/slideLayout8.xml><?xml version="1.0" encoding="utf-8"?>
-<p:sldLayout xmlns:a="http://schemas.openxmlformats.org/drawingml/2006/main" xmlns:p="http://schemas.openxmlformats.org/presentationml/2006/main" xmlns:r="http://schemas.openxmlformats.org/officeDocument/2006/relationships" xmlns:p14="http://schemas.microsoft.com/office/powerpoint/2010/main" xmlns:p15="http://schemas.microsoft.com/office/powerpoint/2012/main" xmlns:mc="http://schemas.openxmlformats.org/markup-compatibility/2006" type="objAndTwoObj" preserve="1">
+<p:sldLayout xmlns:a="http://schemas.openxmlformats.org/drawingml/2006/main" xmlns:r="http://schemas.openxmlformats.org/officeDocument/2006/relationships" xmlns:p="http://schemas.openxmlformats.org/presentationml/2006/main" type="objAndTwoObj" preserve="1">
   <p:cSld name="Title Content and 2 Content">
     <p:spTree>
       <p:nvGrpSpPr>
@@ -1169,9 +1322,10 @@
           </a:prstGeom>
         </p:spPr>
         <p:txBody>
-          <a:bodyPr lIns="0" rIns="0" tIns="0" bIns="0" anchor="ctr"/>
-          <a:p>
-            <a:endParaRPr b="0" lang="en-US" sz="1800" spc="-1" strike="noStrike">
+          <a:bodyPr lIns="0" tIns="0" rIns="0" bIns="0" anchor="ctr"/>
+          <a:lstStyle/>
+          <a:p>
+            <a:endParaRPr lang="en-US" sz="1800" b="0" strike="noStrike" spc="-1">
               <a:solidFill>
                 <a:srgbClr val="000000"/>
               </a:solidFill>
@@ -1200,11 +1354,12 @@
           </a:prstGeom>
         </p:spPr>
         <p:txBody>
-          <a:bodyPr lIns="0" rIns="0" tIns="0" bIns="0">
+          <a:bodyPr lIns="0" tIns="0" rIns="0" bIns="0">
             <a:normAutofit/>
           </a:bodyPr>
-          <a:p>
-            <a:endParaRPr b="0" lang="en-US" sz="2800" spc="-1" strike="noStrike">
+          <a:lstStyle/>
+          <a:p>
+            <a:endParaRPr lang="en-US" sz="2800" b="0" strike="noStrike" spc="-1">
               <a:solidFill>
                 <a:srgbClr val="000000"/>
               </a:solidFill>
@@ -1233,11 +1388,12 @@
           </a:prstGeom>
         </p:spPr>
         <p:txBody>
-          <a:bodyPr lIns="0" rIns="0" tIns="0" bIns="0">
+          <a:bodyPr lIns="0" tIns="0" rIns="0" bIns="0">
             <a:normAutofit/>
           </a:bodyPr>
-          <a:p>
-            <a:endParaRPr b="0" lang="en-US" sz="2800" spc="-1" strike="noStrike">
+          <a:lstStyle/>
+          <a:p>
+            <a:endParaRPr lang="en-US" sz="2800" b="0" strike="noStrike" spc="-1">
               <a:solidFill>
                 <a:srgbClr val="000000"/>
               </a:solidFill>
@@ -1266,11 +1422,12 @@
           </a:prstGeom>
         </p:spPr>
         <p:txBody>
-          <a:bodyPr lIns="0" rIns="0" tIns="0" bIns="0">
+          <a:bodyPr lIns="0" tIns="0" rIns="0" bIns="0">
             <a:normAutofit/>
           </a:bodyPr>
-          <a:p>
-            <a:endParaRPr b="0" lang="en-US" sz="2800" spc="-1" strike="noStrike">
+          <a:lstStyle/>
+          <a:p>
+            <a:endParaRPr lang="en-US" sz="2800" b="0" strike="noStrike" spc="-1">
               <a:solidFill>
                 <a:srgbClr val="000000"/>
               </a:solidFill>
@@ -1281,11 +1438,14 @@
       </p:sp>
     </p:spTree>
   </p:cSld>
+  <p:clrMapOvr>
+    <a:masterClrMapping/>
+  </p:clrMapOvr>
 </p:sldLayout>
 </file>
 
 <file path=ppt/slideLayouts/slideLayout9.xml><?xml version="1.0" encoding="utf-8"?>
-<p:sldLayout xmlns:a="http://schemas.openxmlformats.org/drawingml/2006/main" xmlns:p="http://schemas.openxmlformats.org/presentationml/2006/main" xmlns:r="http://schemas.openxmlformats.org/officeDocument/2006/relationships" xmlns:p14="http://schemas.microsoft.com/office/powerpoint/2010/main" xmlns:p15="http://schemas.microsoft.com/office/powerpoint/2012/main" xmlns:mc="http://schemas.openxmlformats.org/markup-compatibility/2006" type="twoObjOverTx" preserve="1">
+<p:sldLayout xmlns:a="http://schemas.openxmlformats.org/drawingml/2006/main" xmlns:r="http://schemas.openxmlformats.org/officeDocument/2006/relationships" xmlns:p="http://schemas.openxmlformats.org/presentationml/2006/main" type="twoObjOverTx" preserve="1">
   <p:cSld name="Title, 2 Content over Content">
     <p:spTree>
       <p:nvGrpSpPr>
@@ -1321,9 +1481,10 @@
           </a:prstGeom>
         </p:spPr>
         <p:txBody>
-          <a:bodyPr lIns="0" rIns="0" tIns="0" bIns="0" anchor="ctr"/>
-          <a:p>
-            <a:endParaRPr b="0" lang="en-US" sz="1800" spc="-1" strike="noStrike">
+          <a:bodyPr lIns="0" tIns="0" rIns="0" bIns="0" anchor="ctr"/>
+          <a:lstStyle/>
+          <a:p>
+            <a:endParaRPr lang="en-US" sz="1800" b="0" strike="noStrike" spc="-1">
               <a:solidFill>
                 <a:srgbClr val="000000"/>
               </a:solidFill>
@@ -1352,11 +1513,12 @@
           </a:prstGeom>
         </p:spPr>
         <p:txBody>
-          <a:bodyPr lIns="0" rIns="0" tIns="0" bIns="0">
+          <a:bodyPr lIns="0" tIns="0" rIns="0" bIns="0">
             <a:normAutofit/>
           </a:bodyPr>
-          <a:p>
-            <a:endParaRPr b="0" lang="en-US" sz="2800" spc="-1" strike="noStrike">
+          <a:lstStyle/>
+          <a:p>
+            <a:endParaRPr lang="en-US" sz="2800" b="0" strike="noStrike" spc="-1">
               <a:solidFill>
                 <a:srgbClr val="000000"/>
               </a:solidFill>
@@ -1385,11 +1547,12 @@
           </a:prstGeom>
         </p:spPr>
         <p:txBody>
-          <a:bodyPr lIns="0" rIns="0" tIns="0" bIns="0">
+          <a:bodyPr lIns="0" tIns="0" rIns="0" bIns="0">
             <a:normAutofit/>
           </a:bodyPr>
-          <a:p>
-            <a:endParaRPr b="0" lang="en-US" sz="2800" spc="-1" strike="noStrike">
+          <a:lstStyle/>
+          <a:p>
+            <a:endParaRPr lang="en-US" sz="2800" b="0" strike="noStrike" spc="-1">
               <a:solidFill>
                 <a:srgbClr val="000000"/>
               </a:solidFill>
@@ -1418,11 +1581,12 @@
           </a:prstGeom>
         </p:spPr>
         <p:txBody>
-          <a:bodyPr lIns="0" rIns="0" tIns="0" bIns="0">
+          <a:bodyPr lIns="0" tIns="0" rIns="0" bIns="0">
             <a:normAutofit/>
           </a:bodyPr>
-          <a:p>
-            <a:endParaRPr b="0" lang="en-US" sz="2800" spc="-1" strike="noStrike">
+          <a:lstStyle/>
+          <a:p>
+            <a:endParaRPr lang="en-US" sz="2800" b="0" strike="noStrike" spc="-1">
               <a:solidFill>
                 <a:srgbClr val="000000"/>
               </a:solidFill>
@@ -1433,17 +1597,21 @@
       </p:sp>
     </p:spTree>
   </p:cSld>
+  <p:clrMapOvr>
+    <a:masterClrMapping/>
+  </p:clrMapOvr>
 </p:sldLayout>
 </file>
 
 <file path=ppt/slideMasters/slideMaster1.xml><?xml version="1.0" encoding="utf-8"?>
-<p:sldMaster xmlns:a="http://schemas.openxmlformats.org/drawingml/2006/main" xmlns:p="http://schemas.openxmlformats.org/presentationml/2006/main" xmlns:r="http://schemas.openxmlformats.org/officeDocument/2006/relationships" xmlns:p14="http://schemas.microsoft.com/office/powerpoint/2010/main" xmlns:p15="http://schemas.microsoft.com/office/powerpoint/2012/main" xmlns:mc="http://schemas.openxmlformats.org/markup-compatibility/2006">
+<p:sldMaster xmlns:a="http://schemas.openxmlformats.org/drawingml/2006/main" xmlns:r="http://schemas.openxmlformats.org/officeDocument/2006/relationships" xmlns:p="http://schemas.openxmlformats.org/presentationml/2006/main">
   <p:cSld>
     <p:bg>
       <p:bgPr>
         <a:solidFill>
-          <a:srgbClr val="ffffff"/>
+          <a:srgbClr val="FFFFFF"/>
         </a:solidFill>
+        <a:effectLst/>
       </p:bgPr>
     </p:bg>
     <p:spTree>
@@ -1462,7 +1630,7 @@
       </p:grpSpPr>
       <p:sp>
         <p:nvSpPr>
-          <p:cNvPr id="0" name="PlaceHolder 1"/>
+          <p:cNvPr id="2" name="PlaceHolder 1"/>
           <p:cNvSpPr>
             <a:spLocks noGrp="1"/>
           </p:cNvSpPr>
@@ -1480,10 +1648,11 @@
           </a:prstGeom>
         </p:spPr>
         <p:txBody>
-          <a:bodyPr lIns="0" rIns="0" tIns="0" bIns="0" anchor="ctr"/>
+          <a:bodyPr lIns="0" tIns="0" rIns="0" bIns="0" anchor="ctr"/>
+          <a:lstStyle/>
           <a:p>
             <a:r>
-              <a:rPr b="0" lang="en-US" sz="4400" spc="-1" strike="noStrike">
+              <a:rPr lang="en-US" sz="4400" b="0" strike="noStrike" spc="-1">
                 <a:solidFill>
                   <a:srgbClr val="000000"/>
                 </a:solidFill>
@@ -1491,18 +1660,12 @@
               </a:rPr>
               <a:t>Click to edit the title text format</a:t>
             </a:r>
-            <a:endParaRPr b="0" lang="en-US" sz="4400" spc="-1" strike="noStrike">
-              <a:solidFill>
-                <a:srgbClr val="000000"/>
-              </a:solidFill>
-              <a:latin typeface="Arial"/>
-            </a:endParaRPr>
-          </a:p>
-        </p:txBody>
-      </p:sp>
-      <p:sp>
-        <p:nvSpPr>
-          <p:cNvPr id="1" name="PlaceHolder 2"/>
+          </a:p>
+        </p:txBody>
+      </p:sp>
+      <p:sp>
+        <p:nvSpPr>
+          <p:cNvPr id="3" name="PlaceHolder 2"/>
           <p:cNvSpPr>
             <a:spLocks noGrp="1"/>
           </p:cNvSpPr>
@@ -1520,9 +1683,10 @@
           </a:prstGeom>
         </p:spPr>
         <p:txBody>
-          <a:bodyPr lIns="0" rIns="0" tIns="0" bIns="0">
+          <a:bodyPr lIns="0" tIns="0" rIns="0" bIns="0">
             <a:normAutofit/>
           </a:bodyPr>
+          <a:lstStyle/>
           <a:p>
             <a:pPr marL="432000" indent="-324000">
               <a:spcBef>
@@ -1536,7 +1700,7 @@
               <a:buChar char=""/>
             </a:pPr>
             <a:r>
-              <a:rPr b="0" lang="en-US" sz="2800" spc="-1" strike="noStrike">
+              <a:rPr lang="en-US" sz="2800" b="0" strike="noStrike" spc="-1">
                 <a:solidFill>
                   <a:srgbClr val="000000"/>
                 </a:solidFill>
@@ -1544,15 +1708,9 @@
               </a:rPr>
               <a:t>Click to edit the outline text format</a:t>
             </a:r>
-            <a:endParaRPr b="0" lang="en-US" sz="2800" spc="-1" strike="noStrike">
-              <a:solidFill>
-                <a:srgbClr val="000000"/>
-              </a:solidFill>
-              <a:latin typeface="Arial"/>
-            </a:endParaRPr>
-          </a:p>
-          <a:p>
-            <a:pPr lvl="1" marL="864000" indent="-324000">
+          </a:p>
+          <a:p>
+            <a:pPr marL="864000" lvl="1" indent="-324000">
               <a:spcBef>
                 <a:spcPts val="1134"/>
               </a:spcBef>
@@ -1564,7 +1722,7 @@
               <a:buChar char=""/>
             </a:pPr>
             <a:r>
-              <a:rPr b="0" lang="en-US" sz="2000" spc="-1" strike="noStrike">
+              <a:rPr lang="en-US" sz="2000" b="0" strike="noStrike" spc="-1">
                 <a:solidFill>
                   <a:srgbClr val="000000"/>
                 </a:solidFill>
@@ -1572,15 +1730,9 @@
               </a:rPr>
               <a:t>Second Outline Level</a:t>
             </a:r>
-            <a:endParaRPr b="0" lang="en-US" sz="2000" spc="-1" strike="noStrike">
-              <a:solidFill>
-                <a:srgbClr val="000000"/>
-              </a:solidFill>
-              <a:latin typeface="Arial"/>
-            </a:endParaRPr>
-          </a:p>
-          <a:p>
-            <a:pPr lvl="2" marL="1296000" indent="-288000">
+          </a:p>
+          <a:p>
+            <a:pPr marL="1296000" lvl="2" indent="-288000">
               <a:spcBef>
                 <a:spcPts val="850"/>
               </a:spcBef>
@@ -1592,7 +1744,7 @@
               <a:buChar char=""/>
             </a:pPr>
             <a:r>
-              <a:rPr b="0" lang="en-US" sz="1800" spc="-1" strike="noStrike">
+              <a:rPr lang="en-US" sz="1800" b="0" strike="noStrike" spc="-1">
                 <a:solidFill>
                   <a:srgbClr val="000000"/>
                 </a:solidFill>
@@ -1600,15 +1752,9 @@
               </a:rPr>
               <a:t>Third Outline Level</a:t>
             </a:r>
-            <a:endParaRPr b="0" lang="en-US" sz="1800" spc="-1" strike="noStrike">
-              <a:solidFill>
-                <a:srgbClr val="000000"/>
-              </a:solidFill>
-              <a:latin typeface="Arial"/>
-            </a:endParaRPr>
-          </a:p>
-          <a:p>
-            <a:pPr lvl="3" marL="1728000" indent="-216000">
+          </a:p>
+          <a:p>
+            <a:pPr marL="1728000" lvl="3" indent="-216000">
               <a:spcBef>
                 <a:spcPts val="567"/>
               </a:spcBef>
@@ -1620,7 +1766,7 @@
               <a:buChar char=""/>
             </a:pPr>
             <a:r>
-              <a:rPr b="0" lang="en-US" sz="1800" spc="-1" strike="noStrike">
+              <a:rPr lang="en-US" sz="1800" b="0" strike="noStrike" spc="-1">
                 <a:solidFill>
                   <a:srgbClr val="000000"/>
                 </a:solidFill>
@@ -1628,15 +1774,9 @@
               </a:rPr>
               <a:t>Fourth Outline Level</a:t>
             </a:r>
-            <a:endParaRPr b="0" lang="en-US" sz="1800" spc="-1" strike="noStrike">
-              <a:solidFill>
-                <a:srgbClr val="000000"/>
-              </a:solidFill>
-              <a:latin typeface="Arial"/>
-            </a:endParaRPr>
-          </a:p>
-          <a:p>
-            <a:pPr lvl="4" marL="2160000" indent="-216000">
+          </a:p>
+          <a:p>
+            <a:pPr marL="2160000" lvl="4" indent="-216000">
               <a:spcBef>
                 <a:spcPts val="283"/>
               </a:spcBef>
@@ -1648,7 +1788,7 @@
               <a:buChar char=""/>
             </a:pPr>
             <a:r>
-              <a:rPr b="0" lang="en-US" sz="2000" spc="-1" strike="noStrike">
+              <a:rPr lang="en-US" sz="2000" b="0" strike="noStrike" spc="-1">
                 <a:solidFill>
                   <a:srgbClr val="000000"/>
                 </a:solidFill>
@@ -1656,15 +1796,9 @@
               </a:rPr>
               <a:t>Fifth Outline Level</a:t>
             </a:r>
-            <a:endParaRPr b="0" lang="en-US" sz="2000" spc="-1" strike="noStrike">
-              <a:solidFill>
-                <a:srgbClr val="000000"/>
-              </a:solidFill>
-              <a:latin typeface="Arial"/>
-            </a:endParaRPr>
-          </a:p>
-          <a:p>
-            <a:pPr lvl="5" marL="2592000" indent="-216000">
+          </a:p>
+          <a:p>
+            <a:pPr marL="2592000" lvl="5" indent="-216000">
               <a:spcBef>
                 <a:spcPts val="283"/>
               </a:spcBef>
@@ -1676,7 +1810,7 @@
               <a:buChar char=""/>
             </a:pPr>
             <a:r>
-              <a:rPr b="0" lang="en-US" sz="2000" spc="-1" strike="noStrike">
+              <a:rPr lang="en-US" sz="2000" b="0" strike="noStrike" spc="-1">
                 <a:solidFill>
                   <a:srgbClr val="000000"/>
                 </a:solidFill>
@@ -1684,15 +1818,9 @@
               </a:rPr>
               <a:t>Sixth Outline Level</a:t>
             </a:r>
-            <a:endParaRPr b="0" lang="en-US" sz="2000" spc="-1" strike="noStrike">
-              <a:solidFill>
-                <a:srgbClr val="000000"/>
-              </a:solidFill>
-              <a:latin typeface="Arial"/>
-            </a:endParaRPr>
-          </a:p>
-          <a:p>
-            <a:pPr lvl="6" marL="3024000" indent="-216000">
+          </a:p>
+          <a:p>
+            <a:pPr marL="3024000" lvl="6" indent="-216000">
               <a:spcBef>
                 <a:spcPts val="283"/>
               </a:spcBef>
@@ -1704,7 +1832,7 @@
               <a:buChar char=""/>
             </a:pPr>
             <a:r>
-              <a:rPr b="0" lang="en-US" sz="2000" spc="-1" strike="noStrike">
+              <a:rPr lang="en-US" sz="2000" b="0" strike="noStrike" spc="-1">
                 <a:solidFill>
                   <a:srgbClr val="000000"/>
                 </a:solidFill>
@@ -1712,37 +1840,311 @@
               </a:rPr>
               <a:t>Seventh Outline Level</a:t>
             </a:r>
-            <a:endParaRPr b="0" lang="en-US" sz="2000" spc="-1" strike="noStrike">
-              <a:solidFill>
-                <a:srgbClr val="000000"/>
-              </a:solidFill>
-              <a:latin typeface="Arial"/>
-            </a:endParaRPr>
           </a:p>
         </p:txBody>
       </p:sp>
     </p:spTree>
   </p:cSld>
-  <p:clrMap bg1="lt1" bg2="lt2" tx1="dk1" tx2="dk2" accent1="accent1" accent2="accent2" accent3="accent3" accent4="accent4" accent5="accent5" accent6="accent6" hlink="hlink" folHlink="folHlink"/>
+  <p:clrMap bg1="lt1" tx1="dk1" bg2="lt2" tx2="dk2" accent1="accent1" accent2="accent2" accent3="accent3" accent4="accent4" accent5="accent5" accent6="accent6" hlink="hlink" folHlink="folHlink"/>
   <p:sldLayoutIdLst>
-    <p:sldLayoutId id="2147483649" r:id="rId2"/>
-    <p:sldLayoutId id="2147483650" r:id="rId3"/>
-    <p:sldLayoutId id="2147483651" r:id="rId4"/>
-    <p:sldLayoutId id="2147483652" r:id="rId5"/>
-    <p:sldLayoutId id="2147483653" r:id="rId6"/>
-    <p:sldLayoutId id="2147483654" r:id="rId7"/>
-    <p:sldLayoutId id="2147483655" r:id="rId8"/>
-    <p:sldLayoutId id="2147483656" r:id="rId9"/>
-    <p:sldLayoutId id="2147483657" r:id="rId10"/>
-    <p:sldLayoutId id="2147483658" r:id="rId11"/>
-    <p:sldLayoutId id="2147483659" r:id="rId12"/>
-    <p:sldLayoutId id="2147483660" r:id="rId13"/>
+    <p:sldLayoutId id="2147483649" r:id="rId1"/>
+    <p:sldLayoutId id="2147483650" r:id="rId2"/>
+    <p:sldLayoutId id="2147483651" r:id="rId3"/>
+    <p:sldLayoutId id="2147483652" r:id="rId4"/>
+    <p:sldLayoutId id="2147483653" r:id="rId5"/>
+    <p:sldLayoutId id="2147483654" r:id="rId6"/>
+    <p:sldLayoutId id="2147483655" r:id="rId7"/>
+    <p:sldLayoutId id="2147483656" r:id="rId8"/>
+    <p:sldLayoutId id="2147483657" r:id="rId9"/>
+    <p:sldLayoutId id="2147483658" r:id="rId10"/>
+    <p:sldLayoutId id="2147483659" r:id="rId11"/>
+    <p:sldLayoutId id="2147483660" r:id="rId12"/>
   </p:sldLayoutIdLst>
+  <p:txStyles>
+    <p:titleStyle>
+      <a:lvl1pPr algn="l" defTabSz="914400" rtl="0" eaLnBrk="1" latinLnBrk="0" hangingPunct="1">
+        <a:lnSpc>
+          <a:spcPct val="90000"/>
+        </a:lnSpc>
+        <a:spcBef>
+          <a:spcPct val="0"/>
+        </a:spcBef>
+        <a:buNone/>
+        <a:defRPr sz="4400" kern="1200">
+          <a:solidFill>
+            <a:schemeClr val="tx1"/>
+          </a:solidFill>
+          <a:latin typeface="+mj-lt"/>
+          <a:ea typeface="+mj-ea"/>
+          <a:cs typeface="+mj-cs"/>
+        </a:defRPr>
+      </a:lvl1pPr>
+    </p:titleStyle>
+    <p:bodyStyle>
+      <a:lvl1pPr marL="228600" indent="-228600" algn="l" defTabSz="914400" rtl="0" eaLnBrk="1" latinLnBrk="0" hangingPunct="1">
+        <a:lnSpc>
+          <a:spcPct val="90000"/>
+        </a:lnSpc>
+        <a:spcBef>
+          <a:spcPts val="1000"/>
+        </a:spcBef>
+        <a:buFont typeface="Arial" panose="020B0604020202020204" pitchFamily="34" charset="0"/>
+        <a:buChar char="•"/>
+        <a:defRPr sz="2800" kern="1200">
+          <a:solidFill>
+            <a:schemeClr val="tx1"/>
+          </a:solidFill>
+          <a:latin typeface="+mn-lt"/>
+          <a:ea typeface="+mn-ea"/>
+          <a:cs typeface="+mn-cs"/>
+        </a:defRPr>
+      </a:lvl1pPr>
+      <a:lvl2pPr marL="685800" indent="-228600" algn="l" defTabSz="914400" rtl="0" eaLnBrk="1" latinLnBrk="0" hangingPunct="1">
+        <a:lnSpc>
+          <a:spcPct val="90000"/>
+        </a:lnSpc>
+        <a:spcBef>
+          <a:spcPts val="500"/>
+        </a:spcBef>
+        <a:buFont typeface="Arial" panose="020B0604020202020204" pitchFamily="34" charset="0"/>
+        <a:buChar char="•"/>
+        <a:defRPr sz="2400" kern="1200">
+          <a:solidFill>
+            <a:schemeClr val="tx1"/>
+          </a:solidFill>
+          <a:latin typeface="+mn-lt"/>
+          <a:ea typeface="+mn-ea"/>
+          <a:cs typeface="+mn-cs"/>
+        </a:defRPr>
+      </a:lvl2pPr>
+      <a:lvl3pPr marL="1143000" indent="-228600" algn="l" defTabSz="914400" rtl="0" eaLnBrk="1" latinLnBrk="0" hangingPunct="1">
+        <a:lnSpc>
+          <a:spcPct val="90000"/>
+        </a:lnSpc>
+        <a:spcBef>
+          <a:spcPts val="500"/>
+        </a:spcBef>
+        <a:buFont typeface="Arial" panose="020B0604020202020204" pitchFamily="34" charset="0"/>
+        <a:buChar char="•"/>
+        <a:defRPr sz="2000" kern="1200">
+          <a:solidFill>
+            <a:schemeClr val="tx1"/>
+          </a:solidFill>
+          <a:latin typeface="+mn-lt"/>
+          <a:ea typeface="+mn-ea"/>
+          <a:cs typeface="+mn-cs"/>
+        </a:defRPr>
+      </a:lvl3pPr>
+      <a:lvl4pPr marL="1600200" indent="-228600" algn="l" defTabSz="914400" rtl="0" eaLnBrk="1" latinLnBrk="0" hangingPunct="1">
+        <a:lnSpc>
+          <a:spcPct val="90000"/>
+        </a:lnSpc>
+        <a:spcBef>
+          <a:spcPts val="500"/>
+        </a:spcBef>
+        <a:buFont typeface="Arial" panose="020B0604020202020204" pitchFamily="34" charset="0"/>
+        <a:buChar char="•"/>
+        <a:defRPr sz="1800" kern="1200">
+          <a:solidFill>
+            <a:schemeClr val="tx1"/>
+          </a:solidFill>
+          <a:latin typeface="+mn-lt"/>
+          <a:ea typeface="+mn-ea"/>
+          <a:cs typeface="+mn-cs"/>
+        </a:defRPr>
+      </a:lvl4pPr>
+      <a:lvl5pPr marL="2057400" indent="-228600" algn="l" defTabSz="914400" rtl="0" eaLnBrk="1" latinLnBrk="0" hangingPunct="1">
+        <a:lnSpc>
+          <a:spcPct val="90000"/>
+        </a:lnSpc>
+        <a:spcBef>
+          <a:spcPts val="500"/>
+        </a:spcBef>
+        <a:buFont typeface="Arial" panose="020B0604020202020204" pitchFamily="34" charset="0"/>
+        <a:buChar char="•"/>
+        <a:defRPr sz="1800" kern="1200">
+          <a:solidFill>
+            <a:schemeClr val="tx1"/>
+          </a:solidFill>
+          <a:latin typeface="+mn-lt"/>
+          <a:ea typeface="+mn-ea"/>
+          <a:cs typeface="+mn-cs"/>
+        </a:defRPr>
+      </a:lvl5pPr>
+      <a:lvl6pPr marL="2514600" indent="-228600" algn="l" defTabSz="914400" rtl="0" eaLnBrk="1" latinLnBrk="0" hangingPunct="1">
+        <a:lnSpc>
+          <a:spcPct val="90000"/>
+        </a:lnSpc>
+        <a:spcBef>
+          <a:spcPts val="500"/>
+        </a:spcBef>
+        <a:buFont typeface="Arial" panose="020B0604020202020204" pitchFamily="34" charset="0"/>
+        <a:buChar char="•"/>
+        <a:defRPr sz="1800" kern="1200">
+          <a:solidFill>
+            <a:schemeClr val="tx1"/>
+          </a:solidFill>
+          <a:latin typeface="+mn-lt"/>
+          <a:ea typeface="+mn-ea"/>
+          <a:cs typeface="+mn-cs"/>
+        </a:defRPr>
+      </a:lvl6pPr>
+      <a:lvl7pPr marL="2971800" indent="-228600" algn="l" defTabSz="914400" rtl="0" eaLnBrk="1" latinLnBrk="0" hangingPunct="1">
+        <a:lnSpc>
+          <a:spcPct val="90000"/>
+        </a:lnSpc>
+        <a:spcBef>
+          <a:spcPts val="500"/>
+        </a:spcBef>
+        <a:buFont typeface="Arial" panose="020B0604020202020204" pitchFamily="34" charset="0"/>
+        <a:buChar char="•"/>
+        <a:defRPr sz="1800" kern="1200">
+          <a:solidFill>
+            <a:schemeClr val="tx1"/>
+          </a:solidFill>
+          <a:latin typeface="+mn-lt"/>
+          <a:ea typeface="+mn-ea"/>
+          <a:cs typeface="+mn-cs"/>
+        </a:defRPr>
+      </a:lvl7pPr>
+      <a:lvl8pPr marL="3429000" indent="-228600" algn="l" defTabSz="914400" rtl="0" eaLnBrk="1" latinLnBrk="0" hangingPunct="1">
+        <a:lnSpc>
+          <a:spcPct val="90000"/>
+        </a:lnSpc>
+        <a:spcBef>
+          <a:spcPts val="500"/>
+        </a:spcBef>
+        <a:buFont typeface="Arial" panose="020B0604020202020204" pitchFamily="34" charset="0"/>
+        <a:buChar char="•"/>
+        <a:defRPr sz="1800" kern="1200">
+          <a:solidFill>
+            <a:schemeClr val="tx1"/>
+          </a:solidFill>
+          <a:latin typeface="+mn-lt"/>
+          <a:ea typeface="+mn-ea"/>
+          <a:cs typeface="+mn-cs"/>
+        </a:defRPr>
+      </a:lvl8pPr>
+      <a:lvl9pPr marL="3886200" indent="-228600" algn="l" defTabSz="914400" rtl="0" eaLnBrk="1" latinLnBrk="0" hangingPunct="1">
+        <a:lnSpc>
+          <a:spcPct val="90000"/>
+        </a:lnSpc>
+        <a:spcBef>
+          <a:spcPts val="500"/>
+        </a:spcBef>
+        <a:buFont typeface="Arial" panose="020B0604020202020204" pitchFamily="34" charset="0"/>
+        <a:buChar char="•"/>
+        <a:defRPr sz="1800" kern="1200">
+          <a:solidFill>
+            <a:schemeClr val="tx1"/>
+          </a:solidFill>
+          <a:latin typeface="+mn-lt"/>
+          <a:ea typeface="+mn-ea"/>
+          <a:cs typeface="+mn-cs"/>
+        </a:defRPr>
+      </a:lvl9pPr>
+    </p:bodyStyle>
+    <p:otherStyle>
+      <a:defPPr>
+        <a:defRPr lang="en-US"/>
+      </a:defPPr>
+      <a:lvl1pPr marL="0" algn="l" defTabSz="914400" rtl="0" eaLnBrk="1" latinLnBrk="0" hangingPunct="1">
+        <a:defRPr sz="1800" kern="1200">
+          <a:solidFill>
+            <a:schemeClr val="tx1"/>
+          </a:solidFill>
+          <a:latin typeface="+mn-lt"/>
+          <a:ea typeface="+mn-ea"/>
+          <a:cs typeface="+mn-cs"/>
+        </a:defRPr>
+      </a:lvl1pPr>
+      <a:lvl2pPr marL="457200" algn="l" defTabSz="914400" rtl="0" eaLnBrk="1" latinLnBrk="0" hangingPunct="1">
+        <a:defRPr sz="1800" kern="1200">
+          <a:solidFill>
+            <a:schemeClr val="tx1"/>
+          </a:solidFill>
+          <a:latin typeface="+mn-lt"/>
+          <a:ea typeface="+mn-ea"/>
+          <a:cs typeface="+mn-cs"/>
+        </a:defRPr>
+      </a:lvl2pPr>
+      <a:lvl3pPr marL="914400" algn="l" defTabSz="914400" rtl="0" eaLnBrk="1" latinLnBrk="0" hangingPunct="1">
+        <a:defRPr sz="1800" kern="1200">
+          <a:solidFill>
+            <a:schemeClr val="tx1"/>
+          </a:solidFill>
+          <a:latin typeface="+mn-lt"/>
+          <a:ea typeface="+mn-ea"/>
+          <a:cs typeface="+mn-cs"/>
+        </a:defRPr>
+      </a:lvl3pPr>
+      <a:lvl4pPr marL="1371600" algn="l" defTabSz="914400" rtl="0" eaLnBrk="1" latinLnBrk="0" hangingPunct="1">
+        <a:defRPr sz="1800" kern="1200">
+          <a:solidFill>
+            <a:schemeClr val="tx1"/>
+          </a:solidFill>
+          <a:latin typeface="+mn-lt"/>
+          <a:ea typeface="+mn-ea"/>
+          <a:cs typeface="+mn-cs"/>
+        </a:defRPr>
+      </a:lvl4pPr>
+      <a:lvl5pPr marL="1828800" algn="l" defTabSz="914400" rtl="0" eaLnBrk="1" latinLnBrk="0" hangingPunct="1">
+        <a:defRPr sz="1800" kern="1200">
+          <a:solidFill>
+            <a:schemeClr val="tx1"/>
+          </a:solidFill>
+          <a:latin typeface="+mn-lt"/>
+          <a:ea typeface="+mn-ea"/>
+          <a:cs typeface="+mn-cs"/>
+        </a:defRPr>
+      </a:lvl5pPr>
+      <a:lvl6pPr marL="2286000" algn="l" defTabSz="914400" rtl="0" eaLnBrk="1" latinLnBrk="0" hangingPunct="1">
+        <a:defRPr sz="1800" kern="1200">
+          <a:solidFill>
+            <a:schemeClr val="tx1"/>
+          </a:solidFill>
+          <a:latin typeface="+mn-lt"/>
+          <a:ea typeface="+mn-ea"/>
+          <a:cs typeface="+mn-cs"/>
+        </a:defRPr>
+      </a:lvl6pPr>
+      <a:lvl7pPr marL="2743200" algn="l" defTabSz="914400" rtl="0" eaLnBrk="1" latinLnBrk="0" hangingPunct="1">
+        <a:defRPr sz="1800" kern="1200">
+          <a:solidFill>
+            <a:schemeClr val="tx1"/>
+          </a:solidFill>
+          <a:latin typeface="+mn-lt"/>
+          <a:ea typeface="+mn-ea"/>
+          <a:cs typeface="+mn-cs"/>
+        </a:defRPr>
+      </a:lvl7pPr>
+      <a:lvl8pPr marL="3200400" algn="l" defTabSz="914400" rtl="0" eaLnBrk="1" latinLnBrk="0" hangingPunct="1">
+        <a:defRPr sz="1800" kern="1200">
+          <a:solidFill>
+            <a:schemeClr val="tx1"/>
+          </a:solidFill>
+          <a:latin typeface="+mn-lt"/>
+          <a:ea typeface="+mn-ea"/>
+          <a:cs typeface="+mn-cs"/>
+        </a:defRPr>
+      </a:lvl8pPr>
+      <a:lvl9pPr marL="3657600" algn="l" defTabSz="914400" rtl="0" eaLnBrk="1" latinLnBrk="0" hangingPunct="1">
+        <a:defRPr sz="1800" kern="1200">
+          <a:solidFill>
+            <a:schemeClr val="tx1"/>
+          </a:solidFill>
+          <a:latin typeface="+mn-lt"/>
+          <a:ea typeface="+mn-ea"/>
+          <a:cs typeface="+mn-cs"/>
+        </a:defRPr>
+      </a:lvl9pPr>
+    </p:otherStyle>
+  </p:txStyles>
 </p:sldMaster>
 </file>
 
 <file path=ppt/slides/slide1.xml><?xml version="1.0" encoding="utf-8"?>
-<p:sld xmlns:a="http://schemas.openxmlformats.org/drawingml/2006/main" xmlns:p="http://schemas.openxmlformats.org/presentationml/2006/main" xmlns:r="http://schemas.openxmlformats.org/officeDocument/2006/relationships" xmlns:p14="http://schemas.microsoft.com/office/powerpoint/2010/main" xmlns:p15="http://schemas.microsoft.com/office/powerpoint/2012/main" xmlns:mc="http://schemas.openxmlformats.org/markup-compatibility/2006">
+<p:sld xmlns:a="http://schemas.openxmlformats.org/drawingml/2006/main" xmlns:r="http://schemas.openxmlformats.org/officeDocument/2006/relationships" xmlns:p="http://schemas.openxmlformats.org/presentationml/2006/main">
   <p:cSld>
     <p:spTree>
       <p:nvGrpSpPr>
@@ -1758,32 +2160,6 @@
           <a:chExt cx="0" cy="0"/>
         </a:xfrm>
       </p:grpSpPr>
-      <p:sp>
-        <p:nvSpPr>
-          <p:cNvPr id="38" name="CustomShape 1"/>
-          <p:cNvSpPr/>
-          <p:nvPr/>
-        </p:nvSpPr>
-        <p:spPr>
-          <a:xfrm>
-            <a:off x="7070040" y="2136240"/>
-            <a:ext cx="2932920" cy="1554480"/>
-          </a:xfrm>
-          <a:prstGeom prst="ellipse">
-            <a:avLst/>
-          </a:prstGeom>
-          <a:solidFill>
-            <a:srgbClr val="cccccc"/>
-          </a:solidFill>
-          <a:ln/>
-        </p:spPr>
-        <p:style>
-          <a:lnRef idx="0"/>
-          <a:fillRef idx="0"/>
-          <a:effectRef idx="0"/>
-          <a:fontRef idx="minor"/>
-        </p:style>
-      </p:sp>
       <p:grpSp>
         <p:nvGrpSpPr>
           <p:cNvPr id="39" name="Group 2"/>
@@ -1813,14 +2189,20 @@
               <a:avLst/>
             </a:prstGeom>
             <a:solidFill>
-              <a:srgbClr val="cccccc"/>
+              <a:srgbClr val="CCCCCC"/>
             </a:solidFill>
             <a:ln/>
           </p:spPr>
           <p:style>
-            <a:lnRef idx="0"/>
-            <a:fillRef idx="0"/>
-            <a:effectRef idx="0"/>
+            <a:lnRef idx="0">
+              <a:scrgbClr r="0" g="0" b="0"/>
+            </a:lnRef>
+            <a:fillRef idx="0">
+              <a:scrgbClr r="0" g="0" b="0"/>
+            </a:fillRef>
+            <a:effectRef idx="0">
+              <a:scrgbClr r="0" g="0" b="0"/>
+            </a:effectRef>
             <a:fontRef idx="minor"/>
           </p:style>
         </p:sp>
@@ -1844,13 +2226,20 @@
             </a:ln>
           </p:spPr>
           <p:style>
-            <a:lnRef idx="0"/>
-            <a:fillRef idx="0"/>
-            <a:effectRef idx="0"/>
+            <a:lnRef idx="0">
+              <a:scrgbClr r="0" g="0" b="0"/>
+            </a:lnRef>
+            <a:fillRef idx="0">
+              <a:scrgbClr r="0" g="0" b="0"/>
+            </a:fillRef>
+            <a:effectRef idx="0">
+              <a:scrgbClr r="0" g="0" b="0"/>
+            </a:effectRef>
             <a:fontRef idx="minor"/>
           </p:style>
           <p:txBody>
-            <a:bodyPr lIns="90000" rIns="90000" tIns="45000" bIns="45000"/>
+            <a:bodyPr lIns="90000" tIns="45000" rIns="90000" bIns="45000"/>
+            <a:lstStyle/>
             <a:p>
               <a:pPr>
                 <a:lnSpc>
@@ -1858,126 +2247,16 @@
                 </a:lnSpc>
               </a:pPr>
               <a:r>
-                <a:rPr b="0" lang="en-US" sz="1400" spc="-1" strike="noStrike">
+                <a:rPr lang="en-US" sz="1400" b="0" strike="noStrike" spc="-1" dirty="0" smtClean="0">
                   <a:solidFill>
                     <a:srgbClr val="000000"/>
                   </a:solidFill>
                   <a:latin typeface="Arial"/>
                   <a:ea typeface="DejaVu Sans"/>
                 </a:rPr>
-                <a:t>R</a:t>
+                <a:t>    Receiver</a:t>
               </a:r>
-              <a:r>
-                <a:rPr b="0" lang="en-US" sz="1400" spc="-1" strike="noStrike">
-                  <a:solidFill>
-                    <a:srgbClr val="000000"/>
-                  </a:solidFill>
-                  <a:latin typeface="Arial"/>
-                  <a:ea typeface="DejaVu Sans"/>
-                </a:rPr>
-                <a:t>/</a:t>
-              </a:r>
-              <a:r>
-                <a:rPr b="0" lang="en-US" sz="1400" spc="-1" strike="noStrike">
-                  <a:solidFill>
-                    <a:srgbClr val="000000"/>
-                  </a:solidFill>
-                  <a:latin typeface="Arial"/>
-                  <a:ea typeface="DejaVu Sans"/>
-                </a:rPr>
-                <a:t>C</a:t>
-              </a:r>
-              <a:r>
-                <a:rPr b="0" lang="en-US" sz="1400" spc="-1" strike="noStrike">
-                  <a:solidFill>
-                    <a:srgbClr val="000000"/>
-                  </a:solidFill>
-                  <a:latin typeface="Arial"/>
-                  <a:ea typeface="DejaVu Sans"/>
-                </a:rPr>
-                <a:t> </a:t>
-              </a:r>
-              <a:r>
-                <a:rPr b="0" lang="en-US" sz="1400" spc="-1" strike="noStrike">
-                  <a:solidFill>
-                    <a:srgbClr val="000000"/>
-                  </a:solidFill>
-                  <a:latin typeface="Arial"/>
-                  <a:ea typeface="DejaVu Sans"/>
-                </a:rPr>
-                <a:t>R</a:t>
-              </a:r>
-              <a:r>
-                <a:rPr b="0" lang="en-US" sz="1400" spc="-1" strike="noStrike">
-                  <a:solidFill>
-                    <a:srgbClr val="000000"/>
-                  </a:solidFill>
-                  <a:latin typeface="Arial"/>
-                  <a:ea typeface="DejaVu Sans"/>
-                </a:rPr>
-                <a:t>e</a:t>
-              </a:r>
-              <a:r>
-                <a:rPr b="0" lang="en-US" sz="1400" spc="-1" strike="noStrike">
-                  <a:solidFill>
-                    <a:srgbClr val="000000"/>
-                  </a:solidFill>
-                  <a:latin typeface="Arial"/>
-                  <a:ea typeface="DejaVu Sans"/>
-                </a:rPr>
-                <a:t>c</a:t>
-              </a:r>
-              <a:r>
-                <a:rPr b="0" lang="en-US" sz="1400" spc="-1" strike="noStrike">
-                  <a:solidFill>
-                    <a:srgbClr val="000000"/>
-                  </a:solidFill>
-                  <a:latin typeface="Arial"/>
-                  <a:ea typeface="DejaVu Sans"/>
-                </a:rPr>
-                <a:t>e</a:t>
-              </a:r>
-              <a:r>
-                <a:rPr b="0" lang="en-US" sz="1400" spc="-1" strike="noStrike">
-                  <a:solidFill>
-                    <a:srgbClr val="000000"/>
-                  </a:solidFill>
-                  <a:latin typeface="Arial"/>
-                  <a:ea typeface="DejaVu Sans"/>
-                </a:rPr>
-                <a:t>i</a:t>
-              </a:r>
-              <a:r>
-                <a:rPr b="0" lang="en-US" sz="1400" spc="-1" strike="noStrike">
-                  <a:solidFill>
-                    <a:srgbClr val="000000"/>
-                  </a:solidFill>
-                  <a:latin typeface="Arial"/>
-                  <a:ea typeface="DejaVu Sans"/>
-                </a:rPr>
-                <a:t>v</a:t>
-              </a:r>
-              <a:r>
-                <a:rPr b="0" lang="en-US" sz="1400" spc="-1" strike="noStrike">
-                  <a:solidFill>
-                    <a:srgbClr val="000000"/>
-                  </a:solidFill>
-                  <a:latin typeface="Arial"/>
-                  <a:ea typeface="DejaVu Sans"/>
-                </a:rPr>
-                <a:t>e</a:t>
-              </a:r>
-              <a:r>
-                <a:rPr b="0" lang="en-US" sz="1400" spc="-1" strike="noStrike">
-                  <a:solidFill>
-                    <a:srgbClr val="000000"/>
-                  </a:solidFill>
-                  <a:latin typeface="Arial"/>
-                  <a:ea typeface="DejaVu Sans"/>
-                </a:rPr>
-                <a:t>r</a:t>
-              </a:r>
-              <a:endParaRPr b="0" lang="en-US" sz="1400" spc="-1" strike="noStrike">
+              <a:endParaRPr lang="en-US" sz="1400" b="0" strike="noStrike" spc="-1" dirty="0">
                 <a:latin typeface="Arial"/>
               </a:endParaRPr>
             </a:p>
@@ -2013,14 +2292,20 @@
               <a:avLst/>
             </a:prstGeom>
             <a:solidFill>
-              <a:srgbClr val="ff6600"/>
+              <a:srgbClr val="FF6600"/>
             </a:solidFill>
             <a:ln/>
           </p:spPr>
           <p:style>
-            <a:lnRef idx="0"/>
-            <a:fillRef idx="0"/>
-            <a:effectRef idx="0"/>
+            <a:lnRef idx="0">
+              <a:scrgbClr r="0" g="0" b="0"/>
+            </a:lnRef>
+            <a:fillRef idx="0">
+              <a:scrgbClr r="0" g="0" b="0"/>
+            </a:fillRef>
+            <a:effectRef idx="0">
+              <a:scrgbClr r="0" g="0" b="0"/>
+            </a:effectRef>
             <a:fontRef idx="minor"/>
           </p:style>
         </p:sp>
@@ -2044,13 +2329,20 @@
             </a:ln>
           </p:spPr>
           <p:style>
-            <a:lnRef idx="0"/>
-            <a:fillRef idx="0"/>
-            <a:effectRef idx="0"/>
+            <a:lnRef idx="0">
+              <a:scrgbClr r="0" g="0" b="0"/>
+            </a:lnRef>
+            <a:fillRef idx="0">
+              <a:scrgbClr r="0" g="0" b="0"/>
+            </a:fillRef>
+            <a:effectRef idx="0">
+              <a:scrgbClr r="0" g="0" b="0"/>
+            </a:effectRef>
             <a:fontRef idx="minor"/>
           </p:style>
           <p:txBody>
-            <a:bodyPr lIns="90000" rIns="90000" tIns="45000" bIns="45000"/>
+            <a:bodyPr lIns="90000" tIns="45000" rIns="90000" bIns="45000"/>
+            <a:lstStyle/>
             <a:p>
               <a:pPr>
                 <a:lnSpc>
@@ -2058,86 +2350,16 @@
                 </a:lnSpc>
               </a:pPr>
               <a:r>
-                <a:rPr b="0" lang="en-US" sz="1400" spc="-1" strike="noStrike">
+                <a:rPr lang="en-US" sz="1400" b="0" strike="noStrike" spc="-1">
                   <a:solidFill>
                     <a:srgbClr val="000000"/>
                   </a:solidFill>
                   <a:latin typeface="Arial"/>
                   <a:ea typeface="DejaVu Sans"/>
                 </a:rPr>
-                <a:t>  </a:t>
+                <a:t>  Demands</a:t>
               </a:r>
-              <a:r>
-                <a:rPr b="0" lang="en-US" sz="1400" spc="-1" strike="noStrike">
-                  <a:solidFill>
-                    <a:srgbClr val="000000"/>
-                  </a:solidFill>
-                  <a:latin typeface="Arial"/>
-                  <a:ea typeface="DejaVu Sans"/>
-                </a:rPr>
-                <a:t>D</a:t>
-              </a:r>
-              <a:r>
-                <a:rPr b="0" lang="en-US" sz="1400" spc="-1" strike="noStrike">
-                  <a:solidFill>
-                    <a:srgbClr val="000000"/>
-                  </a:solidFill>
-                  <a:latin typeface="Arial"/>
-                  <a:ea typeface="DejaVu Sans"/>
-                </a:rPr>
-                <a:t>e</a:t>
-              </a:r>
-              <a:r>
-                <a:rPr b="0" lang="en-US" sz="1400" spc="-1" strike="noStrike">
-                  <a:solidFill>
-                    <a:srgbClr val="000000"/>
-                  </a:solidFill>
-                  <a:latin typeface="Arial"/>
-                  <a:ea typeface="DejaVu Sans"/>
-                </a:rPr>
-                <a:t>m</a:t>
-              </a:r>
-              <a:r>
-                <a:rPr b="0" lang="en-US" sz="1400" spc="-1" strike="noStrike">
-                  <a:solidFill>
-                    <a:srgbClr val="000000"/>
-                  </a:solidFill>
-                  <a:latin typeface="Arial"/>
-                  <a:ea typeface="DejaVu Sans"/>
-                </a:rPr>
-                <a:t>a</a:t>
-              </a:r>
-              <a:r>
-                <a:rPr b="0" lang="en-US" sz="1400" spc="-1" strike="noStrike">
-                  <a:solidFill>
-                    <a:srgbClr val="000000"/>
-                  </a:solidFill>
-                  <a:latin typeface="Arial"/>
-                  <a:ea typeface="DejaVu Sans"/>
-                </a:rPr>
-                <a:t>n</a:t>
-              </a:r>
-              <a:r>
-                <a:rPr b="0" lang="en-US" sz="1400" spc="-1" strike="noStrike">
-                  <a:solidFill>
-                    <a:srgbClr val="000000"/>
-                  </a:solidFill>
-                  <a:latin typeface="Arial"/>
-                  <a:ea typeface="DejaVu Sans"/>
-                </a:rPr>
-                <a:t>d</a:t>
-              </a:r>
-              <a:r>
-                <a:rPr b="0" lang="en-US" sz="1400" spc="-1" strike="noStrike">
-                  <a:solidFill>
-                    <a:srgbClr val="000000"/>
-                  </a:solidFill>
-                  <a:latin typeface="Arial"/>
-                  <a:ea typeface="DejaVu Sans"/>
-                </a:rPr>
-                <a:t>s</a:t>
-              </a:r>
-              <a:endParaRPr b="0" lang="en-US" sz="1400" spc="-1" strike="noStrike">
+              <a:endParaRPr lang="en-US" sz="1400" b="0" strike="noStrike" spc="-1">
                 <a:latin typeface="Arial"/>
               </a:endParaRPr>
             </a:p>
@@ -2159,14 +2381,20 @@
             <a:avLst/>
           </a:prstGeom>
           <a:solidFill>
-            <a:srgbClr val="66ff00"/>
+            <a:srgbClr val="66FF00"/>
           </a:solidFill>
           <a:ln/>
         </p:spPr>
         <p:style>
-          <a:lnRef idx="0"/>
-          <a:fillRef idx="0"/>
-          <a:effectRef idx="0"/>
+          <a:lnRef idx="0">
+            <a:scrgbClr r="0" g="0" b="0"/>
+          </a:lnRef>
+          <a:fillRef idx="0">
+            <a:scrgbClr r="0" g="0" b="0"/>
+          </a:fillRef>
+          <a:effectRef idx="0">
+            <a:scrgbClr r="0" g="0" b="0"/>
+          </a:effectRef>
           <a:fontRef idx="minor"/>
         </p:style>
       </p:sp>
@@ -2190,13 +2418,20 @@
           </a:ln>
         </p:spPr>
         <p:style>
-          <a:lnRef idx="0"/>
-          <a:fillRef idx="0"/>
-          <a:effectRef idx="0"/>
+          <a:lnRef idx="0">
+            <a:scrgbClr r="0" g="0" b="0"/>
+          </a:lnRef>
+          <a:fillRef idx="0">
+            <a:scrgbClr r="0" g="0" b="0"/>
+          </a:fillRef>
+          <a:effectRef idx="0">
+            <a:scrgbClr r="0" g="0" b="0"/>
+          </a:effectRef>
           <a:fontRef idx="minor"/>
         </p:style>
         <p:txBody>
-          <a:bodyPr lIns="90000" rIns="90000" tIns="45000" bIns="45000"/>
+          <a:bodyPr lIns="90000" tIns="45000" rIns="90000" bIns="45000"/>
+          <a:lstStyle/>
           <a:p>
             <a:pPr>
               <a:lnSpc>
@@ -2204,7 +2439,7 @@
               </a:lnSpc>
             </a:pPr>
             <a:r>
-              <a:rPr b="0" lang="en-US" sz="1400" spc="-1" strike="noStrike">
+              <a:rPr lang="en-US" sz="1400" b="0" strike="noStrike" spc="-1">
                 <a:solidFill>
                   <a:srgbClr val="000000"/>
                 </a:solidFill>
@@ -2213,7 +2448,7 @@
               </a:rPr>
               <a:t>State</a:t>
             </a:r>
-            <a:endParaRPr b="0" lang="en-US" sz="1400" spc="-1" strike="noStrike">
+            <a:endParaRPr lang="en-US" sz="1400" b="0" strike="noStrike" spc="-1">
               <a:latin typeface="Arial"/>
             </a:endParaRPr>
           </a:p>
@@ -2248,14 +2483,20 @@
               <a:avLst/>
             </a:prstGeom>
             <a:solidFill>
-              <a:srgbClr val="ff6600"/>
+              <a:srgbClr val="FF6600"/>
             </a:solidFill>
             <a:ln/>
           </p:spPr>
           <p:style>
-            <a:lnRef idx="0"/>
-            <a:fillRef idx="0"/>
-            <a:effectRef idx="0"/>
+            <a:lnRef idx="0">
+              <a:scrgbClr r="0" g="0" b="0"/>
+            </a:lnRef>
+            <a:fillRef idx="0">
+              <a:scrgbClr r="0" g="0" b="0"/>
+            </a:fillRef>
+            <a:effectRef idx="0">
+              <a:scrgbClr r="0" g="0" b="0"/>
+            </a:effectRef>
             <a:fontRef idx="minor"/>
           </p:style>
         </p:sp>
@@ -2279,13 +2520,20 @@
             </a:ln>
           </p:spPr>
           <p:style>
-            <a:lnRef idx="0"/>
-            <a:fillRef idx="0"/>
-            <a:effectRef idx="0"/>
+            <a:lnRef idx="0">
+              <a:scrgbClr r="0" g="0" b="0"/>
+            </a:lnRef>
+            <a:fillRef idx="0">
+              <a:scrgbClr r="0" g="0" b="0"/>
+            </a:fillRef>
+            <a:effectRef idx="0">
+              <a:scrgbClr r="0" g="0" b="0"/>
+            </a:effectRef>
             <a:fontRef idx="minor"/>
           </p:style>
           <p:txBody>
-            <a:bodyPr lIns="90000" rIns="90000" tIns="45000" bIns="45000"/>
+            <a:bodyPr lIns="90000" tIns="45000" rIns="90000" bIns="45000"/>
+            <a:lstStyle/>
             <a:p>
               <a:pPr>
                 <a:lnSpc>
@@ -2293,26 +2541,16 @@
                 </a:lnSpc>
               </a:pPr>
               <a:r>
-                <a:rPr b="0" lang="en-US" sz="1400" spc="-1" strike="noStrike">
+                <a:rPr lang="en-US" sz="1400" b="0" strike="noStrike" spc="-1">
                   <a:solidFill>
                     <a:srgbClr val="000000"/>
                   </a:solidFill>
                   <a:latin typeface="Arial"/>
                   <a:ea typeface="DejaVu Sans"/>
                 </a:rPr>
-                <a:t>Dema</a:t>
+                <a:t>Demands</a:t>
               </a:r>
-              <a:r>
-                <a:rPr b="0" lang="en-US" sz="1400" spc="-1" strike="noStrike">
-                  <a:solidFill>
-                    <a:srgbClr val="000000"/>
-                  </a:solidFill>
-                  <a:latin typeface="Arial"/>
-                  <a:ea typeface="DejaVu Sans"/>
-                </a:rPr>
-                <a:t>nds</a:t>
-              </a:r>
-              <a:endParaRPr b="0" lang="en-US" sz="1400" spc="-1" strike="noStrike">
+              <a:endParaRPr lang="en-US" sz="1400" b="0" strike="noStrike" spc="-1">
                 <a:latin typeface="Arial"/>
               </a:endParaRPr>
             </a:p>
@@ -2334,14 +2572,20 @@
             <a:avLst/>
           </a:prstGeom>
           <a:solidFill>
-            <a:srgbClr val="729fcf"/>
+            <a:srgbClr val="729FCF"/>
           </a:solidFill>
           <a:ln/>
         </p:spPr>
         <p:style>
-          <a:lnRef idx="0"/>
-          <a:fillRef idx="0"/>
-          <a:effectRef idx="0"/>
+          <a:lnRef idx="0">
+            <a:scrgbClr r="0" g="0" b="0"/>
+          </a:lnRef>
+          <a:fillRef idx="0">
+            <a:scrgbClr r="0" g="0" b="0"/>
+          </a:fillRef>
+          <a:effectRef idx="0">
+            <a:scrgbClr r="0" g="0" b="0"/>
+          </a:effectRef>
           <a:fontRef idx="minor"/>
         </p:style>
       </p:sp>
@@ -2365,13 +2609,20 @@
           </a:ln>
         </p:spPr>
         <p:style>
-          <a:lnRef idx="0"/>
-          <a:fillRef idx="0"/>
-          <a:effectRef idx="0"/>
+          <a:lnRef idx="0">
+            <a:scrgbClr r="0" g="0" b="0"/>
+          </a:lnRef>
+          <a:fillRef idx="0">
+            <a:scrgbClr r="0" g="0" b="0"/>
+          </a:fillRef>
+          <a:effectRef idx="0">
+            <a:scrgbClr r="0" g="0" b="0"/>
+          </a:effectRef>
           <a:fontRef idx="minor"/>
         </p:style>
         <p:txBody>
-          <a:bodyPr lIns="90000" rIns="90000" tIns="45000" bIns="45000"/>
+          <a:bodyPr lIns="90000" tIns="45000" rIns="90000" bIns="45000"/>
+          <a:lstStyle/>
           <a:p>
             <a:pPr>
               <a:lnSpc>
@@ -2379,7 +2630,7 @@
               </a:lnSpc>
             </a:pPr>
             <a:r>
-              <a:rPr b="0" lang="en-US" sz="1400" spc="-1" strike="noStrike">
+              <a:rPr lang="en-US" sz="1400" b="0" strike="noStrike" spc="-1" dirty="0">
                 <a:solidFill>
                   <a:srgbClr val="000000"/>
                 </a:solidFill>
@@ -2388,7 +2639,7 @@
               </a:rPr>
               <a:t>Mixer</a:t>
             </a:r>
-            <a:endParaRPr b="0" lang="en-US" sz="1400" spc="-1" strike="noStrike">
+            <a:endParaRPr lang="en-US" sz="1400" b="0" strike="noStrike" spc="-1" dirty="0">
               <a:latin typeface="Arial"/>
             </a:endParaRPr>
           </a:p>
@@ -2409,14 +2660,20 @@
             <a:avLst/>
           </a:prstGeom>
           <a:solidFill>
-            <a:srgbClr val="cccccc"/>
+            <a:srgbClr val="CCCCCC"/>
           </a:solidFill>
           <a:ln/>
         </p:spPr>
         <p:style>
-          <a:lnRef idx="0"/>
-          <a:fillRef idx="0"/>
-          <a:effectRef idx="0"/>
+          <a:lnRef idx="0">
+            <a:scrgbClr r="0" g="0" b="0"/>
+          </a:lnRef>
+          <a:fillRef idx="0">
+            <a:scrgbClr r="0" g="0" b="0"/>
+          </a:fillRef>
+          <a:effectRef idx="0">
+            <a:scrgbClr r="0" g="0" b="0"/>
+          </a:effectRef>
           <a:fontRef idx="minor"/>
         </p:style>
       </p:sp>
@@ -2440,13 +2697,20 @@
           </a:ln>
         </p:spPr>
         <p:style>
-          <a:lnRef idx="0"/>
-          <a:fillRef idx="0"/>
-          <a:effectRef idx="0"/>
+          <a:lnRef idx="0">
+            <a:scrgbClr r="0" g="0" b="0"/>
+          </a:lnRef>
+          <a:fillRef idx="0">
+            <a:scrgbClr r="0" g="0" b="0"/>
+          </a:fillRef>
+          <a:effectRef idx="0">
+            <a:scrgbClr r="0" g="0" b="0"/>
+          </a:effectRef>
           <a:fontRef idx="minor"/>
         </p:style>
         <p:txBody>
-          <a:bodyPr lIns="90000" rIns="90000" tIns="45000" bIns="45000"/>
+          <a:bodyPr lIns="90000" tIns="45000" rIns="90000" bIns="45000"/>
+          <a:lstStyle/>
           <a:p>
             <a:pPr algn="ctr">
               <a:lnSpc>
@@ -2454,7 +2718,7 @@
               </a:lnSpc>
             </a:pPr>
             <a:r>
-              <a:rPr b="0" lang="en-US" sz="1500" spc="-1" strike="noStrike">
+              <a:rPr lang="en-US" sz="1500" b="0" strike="noStrike" spc="-1">
                 <a:solidFill>
                   <a:srgbClr val="000000"/>
                 </a:solidFill>
@@ -2463,7 +2727,7 @@
               </a:rPr>
               <a:t>PID </a:t>
             </a:r>
-            <a:endParaRPr b="0" lang="en-US" sz="1500" spc="-1" strike="noStrike">
+            <a:endParaRPr lang="en-US" sz="1500" b="0" strike="noStrike" spc="-1">
               <a:latin typeface="Arial"/>
             </a:endParaRPr>
           </a:p>
@@ -2474,7 +2738,7 @@
               </a:lnSpc>
             </a:pPr>
             <a:r>
-              <a:rPr b="0" lang="en-US" sz="1500" spc="-1" strike="noStrike">
+              <a:rPr lang="en-US" sz="1500" b="0" strike="noStrike" spc="-1">
                 <a:solidFill>
                   <a:srgbClr val="000000"/>
                 </a:solidFill>
@@ -2483,67 +2747,11 @@
               </a:rPr>
               <a:t>Controllers</a:t>
             </a:r>
-            <a:endParaRPr b="0" lang="en-US" sz="1500" spc="-1" strike="noStrike">
-              <a:latin typeface="Arial"/>
-            </a:endParaRPr>
-          </a:p>
-        </p:txBody>
-      </p:sp>
-      <p:sp>
-        <p:nvSpPr>
-          <p:cNvPr id="54" name="CustomShape 17"/>
-          <p:cNvSpPr/>
-          <p:nvPr/>
-        </p:nvSpPr>
-        <p:spPr>
-          <a:xfrm>
-            <a:off x="3981600" y="2578680"/>
-            <a:ext cx="172080" cy="182520"/>
-          </a:xfrm>
-          <a:prstGeom prst="ellipse">
-            <a:avLst/>
-          </a:prstGeom>
-          <a:noFill/>
-          <a:ln>
-            <a:solidFill>
-              <a:srgbClr val="3465a4"/>
-            </a:solidFill>
-          </a:ln>
-        </p:spPr>
-        <p:style>
-          <a:lnRef idx="0"/>
-          <a:fillRef idx="0"/>
-          <a:effectRef idx="0"/>
-          <a:fontRef idx="minor"/>
-        </p:style>
-      </p:sp>
-      <p:sp>
-        <p:nvSpPr>
-          <p:cNvPr id="55" name="CustomShape 18"/>
-          <p:cNvSpPr/>
-          <p:nvPr/>
-        </p:nvSpPr>
-        <p:spPr>
-          <a:xfrm>
-            <a:off x="3981960" y="2939040"/>
-            <a:ext cx="172080" cy="182520"/>
-          </a:xfrm>
-          <a:prstGeom prst="ellipse">
-            <a:avLst/>
-          </a:prstGeom>
-          <a:noFill/>
-          <a:ln>
-            <a:solidFill>
-              <a:srgbClr val="3465a4"/>
-            </a:solidFill>
-          </a:ln>
-        </p:spPr>
-        <p:style>
-          <a:lnRef idx="0"/>
-          <a:fillRef idx="0"/>
-          <a:effectRef idx="0"/>
-          <a:fontRef idx="minor"/>
-        </p:style>
+            <a:endParaRPr lang="en-US" sz="1500" b="0" strike="noStrike" spc="-1">
+              <a:latin typeface="Arial"/>
+            </a:endParaRPr>
+          </a:p>
+        </p:txBody>
       </p:sp>
       <p:grpSp>
         <p:nvGrpSpPr>
@@ -2574,14 +2782,20 @@
               <a:avLst/>
             </a:prstGeom>
             <a:solidFill>
-              <a:srgbClr val="cccccc"/>
+              <a:srgbClr val="CCCCCC"/>
             </a:solidFill>
             <a:ln/>
           </p:spPr>
           <p:style>
-            <a:lnRef idx="0"/>
-            <a:fillRef idx="0"/>
-            <a:effectRef idx="0"/>
+            <a:lnRef idx="0">
+              <a:scrgbClr r="0" g="0" b="0"/>
+            </a:lnRef>
+            <a:fillRef idx="0">
+              <a:scrgbClr r="0" g="0" b="0"/>
+            </a:fillRef>
+            <a:effectRef idx="0">
+              <a:scrgbClr r="0" g="0" b="0"/>
+            </a:effectRef>
             <a:fontRef idx="minor"/>
           </p:style>
         </p:sp>
@@ -2605,13 +2819,20 @@
             </a:ln>
           </p:spPr>
           <p:style>
-            <a:lnRef idx="0"/>
-            <a:fillRef idx="0"/>
-            <a:effectRef idx="0"/>
+            <a:lnRef idx="0">
+              <a:scrgbClr r="0" g="0" b="0"/>
+            </a:lnRef>
+            <a:fillRef idx="0">
+              <a:scrgbClr r="0" g="0" b="0"/>
+            </a:fillRef>
+            <a:effectRef idx="0">
+              <a:scrgbClr r="0" g="0" b="0"/>
+            </a:effectRef>
             <a:fontRef idx="minor"/>
           </p:style>
           <p:txBody>
-            <a:bodyPr lIns="90000" rIns="90000" tIns="45000" bIns="45000"/>
+            <a:bodyPr lIns="90000" tIns="45000" rIns="90000" bIns="45000"/>
+            <a:lstStyle/>
             <a:p>
               <a:pPr>
                 <a:lnSpc>
@@ -2619,26 +2840,16 @@
                 </a:lnSpc>
               </a:pPr>
               <a:r>
-                <a:rPr b="0" lang="en-US" sz="1400" spc="-1" strike="noStrike">
+                <a:rPr lang="en-US" sz="1400" b="0" strike="noStrike" spc="-1">
                   <a:solidFill>
                     <a:srgbClr val="000000"/>
                   </a:solidFill>
                   <a:latin typeface="Arial"/>
                   <a:ea typeface="DejaVu Sans"/>
                 </a:rPr>
-                <a:t>Sen</a:t>
+                <a:t>Sensors</a:t>
               </a:r>
-              <a:r>
-                <a:rPr b="0" lang="en-US" sz="1400" spc="-1" strike="noStrike">
-                  <a:solidFill>
-                    <a:srgbClr val="000000"/>
-                  </a:solidFill>
-                  <a:latin typeface="Arial"/>
-                  <a:ea typeface="DejaVu Sans"/>
-                </a:rPr>
-                <a:t>sors</a:t>
-              </a:r>
-              <a:endParaRPr b="0" lang="en-US" sz="1400" spc="-1" strike="noStrike">
+              <a:endParaRPr lang="en-US" sz="1400" b="0" strike="noStrike" spc="-1">
                 <a:latin typeface="Arial"/>
               </a:endParaRPr>
             </a:p>
@@ -2673,14 +2884,20 @@
                 <a:avLst/>
               </a:prstGeom>
               <a:solidFill>
-                <a:srgbClr val="729fcf"/>
+                <a:srgbClr val="729FCF"/>
               </a:solidFill>
               <a:ln/>
             </p:spPr>
             <p:style>
-              <a:lnRef idx="0"/>
-              <a:fillRef idx="0"/>
-              <a:effectRef idx="0"/>
+              <a:lnRef idx="0">
+                <a:scrgbClr r="0" g="0" b="0"/>
+              </a:lnRef>
+              <a:fillRef idx="0">
+                <a:scrgbClr r="0" g="0" b="0"/>
+              </a:fillRef>
+              <a:effectRef idx="0">
+                <a:scrgbClr r="0" g="0" b="0"/>
+              </a:effectRef>
               <a:fontRef idx="minor"/>
             </p:style>
           </p:sp>
@@ -2704,13 +2921,20 @@
               </a:ln>
             </p:spPr>
             <p:style>
-              <a:lnRef idx="0"/>
-              <a:fillRef idx="0"/>
-              <a:effectRef idx="0"/>
+              <a:lnRef idx="0">
+                <a:scrgbClr r="0" g="0" b="0"/>
+              </a:lnRef>
+              <a:fillRef idx="0">
+                <a:scrgbClr r="0" g="0" b="0"/>
+              </a:fillRef>
+              <a:effectRef idx="0">
+                <a:scrgbClr r="0" g="0" b="0"/>
+              </a:effectRef>
               <a:fontRef idx="minor"/>
             </p:style>
             <p:txBody>
-              <a:bodyPr lIns="90000" rIns="90000" tIns="45000" bIns="45000"/>
+              <a:bodyPr lIns="90000" tIns="45000" rIns="90000" bIns="45000"/>
+              <a:lstStyle/>
               <a:p>
                 <a:pPr>
                   <a:lnSpc>
@@ -2718,7 +2942,7 @@
                   </a:lnSpc>
                 </a:pPr>
                 <a:r>
-                  <a:rPr b="0" lang="en-US" sz="1400" spc="-1" strike="noStrike">
+                  <a:rPr lang="en-US" sz="1400" b="0" strike="noStrike" spc="-1">
                     <a:solidFill>
                       <a:srgbClr val="000000"/>
                     </a:solidFill>
@@ -2727,7 +2951,7 @@
                   </a:rPr>
                   <a:t>IMU</a:t>
                 </a:r>
-                <a:endParaRPr b="0" lang="en-US" sz="1400" spc="-1" strike="noStrike">
+                <a:endParaRPr lang="en-US" sz="1400" b="0" strike="noStrike" spc="-1">
                   <a:latin typeface="Arial"/>
                 </a:endParaRPr>
               </a:p>
@@ -2756,7 +2980,7 @@
             <a:solidFill>
               <a:srgbClr val="000000"/>
             </a:solidFill>
-            <a:tailEnd len="med" type="triangle" w="med"/>
+            <a:tailEnd type="triangle" w="med" len="med"/>
           </a:ln>
         </p:spPr>
       </p:cxnSp>
@@ -2781,7 +3005,7 @@
             <a:solidFill>
               <a:srgbClr val="000000"/>
             </a:solidFill>
-            <a:tailEnd len="med" type="triangle" w="med"/>
+            <a:tailEnd type="triangle" w="med" len="med"/>
           </a:ln>
         </p:spPr>
       </p:cxnSp>
@@ -2805,32 +3029,7 @@
             <a:solidFill>
               <a:srgbClr val="000000"/>
             </a:solidFill>
-            <a:tailEnd len="med" type="triangle" w="med"/>
-          </a:ln>
-        </p:spPr>
-      </p:cxnSp>
-      <p:cxnSp>
-        <p:nvCxnSpPr>
-          <p:cNvPr id="65" name="Line 28"/>
-          <p:cNvCxnSpPr>
-            <a:stCxn id="45" idx="2"/>
-            <a:endCxn id="56" idx="2"/>
-          </p:cNvCxnSpPr>
-          <p:nvPr/>
-        </p:nvCxnSpPr>
-        <p:spPr>
-          <a:xfrm flipH="1">
-            <a:off x="923040" y="3977280"/>
-            <a:ext cx="2021400" cy="320760"/>
-          </a:xfrm>
-          <a:prstGeom prst="curvedConnector3">
-            <a:avLst/>
-          </a:prstGeom>
-          <a:ln>
-            <a:solidFill>
-              <a:srgbClr val="000000"/>
-            </a:solidFill>
-            <a:tailEnd len="med" type="triangle" w="med"/>
+            <a:tailEnd type="triangle" w="med" len="med"/>
           </a:ln>
         </p:spPr>
       </p:cxnSp>
@@ -2854,7 +3053,7 @@
             <a:solidFill>
               <a:srgbClr val="000000"/>
             </a:solidFill>
-            <a:tailEnd len="med" type="triangle" w="med"/>
+            <a:tailEnd type="triangle" w="med" len="med"/>
           </a:ln>
         </p:spPr>
       </p:cxnSp>
@@ -2879,22 +3078,19 @@
             <a:solidFill>
               <a:srgbClr val="000000"/>
             </a:solidFill>
-            <a:tailEnd len="med" type="triangle" w="med"/>
+            <a:tailEnd type="triangle" w="med" len="med"/>
           </a:ln>
         </p:spPr>
       </p:cxnSp>
       <p:cxnSp>
         <p:nvCxnSpPr>
           <p:cNvPr id="68" name="Line 31"/>
-          <p:cNvCxnSpPr>
-            <a:stCxn id="47" idx="3"/>
-            <a:endCxn id="38" idx="1"/>
-          </p:cNvCxnSpPr>
+          <p:cNvCxnSpPr/>
           <p:nvPr/>
         </p:nvCxnSpPr>
         <p:spPr>
           <a:xfrm flipV="1">
-            <a:off x="6794280" y="2913480"/>
+            <a:off x="6818658" y="2904959"/>
             <a:ext cx="276120" cy="3960"/>
           </a:xfrm>
           <a:prstGeom prst="straightConnector1">
@@ -2904,32 +3100,7 @@
             <a:solidFill>
               <a:srgbClr val="000000"/>
             </a:solidFill>
-            <a:tailEnd len="med" type="triangle" w="med"/>
-          </a:ln>
-        </p:spPr>
-      </p:cxnSp>
-      <p:cxnSp>
-        <p:nvCxnSpPr>
-          <p:cNvPr id="69" name="Line 32"/>
-          <p:cNvCxnSpPr>
-            <a:stCxn id="38" idx="2"/>
-            <a:endCxn id="45" idx="2"/>
-          </p:cNvCxnSpPr>
-          <p:nvPr/>
-        </p:nvCxnSpPr>
-        <p:spPr>
-          <a:xfrm flipH="1">
-            <a:off x="2944080" y="3690720"/>
-            <a:ext cx="5592600" cy="286920"/>
-          </a:xfrm>
-          <a:prstGeom prst="curvedConnector3">
-            <a:avLst/>
-          </a:prstGeom>
-          <a:ln>
-            <a:solidFill>
-              <a:srgbClr val="000000"/>
-            </a:solidFill>
-            <a:tailEnd len="med" type="triangle" w="med"/>
+            <a:tailEnd type="triangle" w="med" len="med"/>
           </a:ln>
         </p:spPr>
       </p:cxnSp>
@@ -2948,14 +3119,20 @@
             <a:avLst/>
           </a:prstGeom>
           <a:solidFill>
-            <a:srgbClr val="729fcf"/>
+            <a:srgbClr val="729FCF"/>
           </a:solidFill>
           <a:ln/>
         </p:spPr>
         <p:style>
-          <a:lnRef idx="0"/>
-          <a:fillRef idx="0"/>
-          <a:effectRef idx="0"/>
+          <a:lnRef idx="0">
+            <a:scrgbClr r="0" g="0" b="0"/>
+          </a:lnRef>
+          <a:fillRef idx="0">
+            <a:scrgbClr r="0" g="0" b="0"/>
+          </a:fillRef>
+          <a:effectRef idx="0">
+            <a:scrgbClr r="0" g="0" b="0"/>
+          </a:effectRef>
           <a:fontRef idx="minor"/>
         </p:style>
       </p:sp>
@@ -2979,13 +3156,20 @@
           </a:ln>
         </p:spPr>
         <p:style>
-          <a:lnRef idx="0"/>
-          <a:fillRef idx="0"/>
-          <a:effectRef idx="0"/>
+          <a:lnRef idx="0">
+            <a:scrgbClr r="0" g="0" b="0"/>
+          </a:lnRef>
+          <a:fillRef idx="0">
+            <a:scrgbClr r="0" g="0" b="0"/>
+          </a:fillRef>
+          <a:effectRef idx="0">
+            <a:scrgbClr r="0" g="0" b="0"/>
+          </a:effectRef>
           <a:fontRef idx="minor"/>
         </p:style>
         <p:txBody>
-          <a:bodyPr lIns="90000" rIns="90000" tIns="45000" bIns="45000"/>
+          <a:bodyPr lIns="90000" tIns="45000" rIns="90000" bIns="45000"/>
+          <a:lstStyle/>
           <a:p>
             <a:pPr>
               <a:lnSpc>
@@ -2993,7 +3177,7 @@
               </a:lnSpc>
             </a:pPr>
             <a:r>
-              <a:rPr b="0" lang="en-US" sz="1400" spc="-1" strike="noStrike">
+              <a:rPr lang="en-US" sz="1400" b="0" strike="noStrike" spc="-1">
                 <a:solidFill>
                   <a:srgbClr val="000000"/>
                 </a:solidFill>
@@ -3002,7 +3186,7 @@
               </a:rPr>
               <a:t>Motors</a:t>
             </a:r>
-            <a:endParaRPr b="0" lang="en-US" sz="1400" spc="-1" strike="noStrike">
+            <a:endParaRPr lang="en-US" sz="1400" b="0" strike="noStrike" spc="-1">
               <a:latin typeface="Arial"/>
             </a:endParaRPr>
           </a:p>
@@ -3028,61 +3212,91 @@
             <a:solidFill>
               <a:srgbClr val="000000"/>
             </a:solidFill>
-            <a:tailEnd len="med" type="triangle" w="med"/>
+            <a:tailEnd type="triangle" w="med" len="med"/>
           </a:ln>
         </p:spPr>
       </p:cxnSp>
-      <p:sp>
-        <p:nvSpPr>
-          <p:cNvPr id="73" name="CustomShape 36"/>
-          <p:cNvSpPr/>
+      <p:cxnSp>
+        <p:nvCxnSpPr>
+          <p:cNvPr id="4" name="Curved Connector 3"/>
+          <p:cNvCxnSpPr>
+            <a:stCxn id="71" idx="2"/>
+            <a:endCxn id="45" idx="2"/>
+          </p:cNvCxnSpPr>
           <p:nvPr/>
-        </p:nvSpPr>
-        <p:spPr>
-          <a:xfrm>
-            <a:off x="8203320" y="3255840"/>
-            <a:ext cx="941040" cy="318600"/>
-          </a:xfrm>
-          <a:prstGeom prst="rect">
-            <a:avLst/>
-          </a:prstGeom>
-          <a:noFill/>
+        </p:nvCxnSpPr>
+        <p:spPr>
+          <a:xfrm rot="5400000">
+            <a:off x="5720670" y="302310"/>
+            <a:ext cx="898560" cy="6451380"/>
+          </a:xfrm>
+          <a:prstGeom prst="curvedConnector3">
+            <a:avLst>
+              <a:gd name="adj1" fmla="val 211844"/>
+            </a:avLst>
+          </a:prstGeom>
           <a:ln>
-            <a:noFill/>
+            <a:tailEnd type="triangle"/>
           </a:ln>
         </p:spPr>
         <p:style>
-          <a:lnRef idx="0"/>
-          <a:fillRef idx="0"/>
-          <a:effectRef idx="0"/>
-          <a:fontRef idx="minor"/>
+          <a:lnRef idx="1">
+            <a:schemeClr val="dk1"/>
+          </a:lnRef>
+          <a:fillRef idx="0">
+            <a:schemeClr val="dk1"/>
+          </a:fillRef>
+          <a:effectRef idx="0">
+            <a:schemeClr val="dk1"/>
+          </a:effectRef>
+          <a:fontRef idx="minor">
+            <a:schemeClr val="tx1"/>
+          </a:fontRef>
         </p:style>
-        <p:txBody>
-          <a:bodyPr lIns="90000" rIns="90000" tIns="45000" bIns="45000"/>
-          <a:p>
-            <a:pPr>
-              <a:lnSpc>
-                <a:spcPct val="100000"/>
-              </a:lnSpc>
-            </a:pPr>
-            <a:r>
-              <a:rPr b="0" lang="en-US" sz="1400" spc="-1" strike="noStrike">
-                <a:solidFill>
-                  <a:srgbClr val="000000"/>
-                </a:solidFill>
-                <a:latin typeface="Arial"/>
-                <a:ea typeface="DejaVu Sans"/>
-              </a:rPr>
-              <a:t>Actuator</a:t>
-            </a:r>
-            <a:endParaRPr b="0" lang="en-US" sz="1400" spc="-1" strike="noStrike">
-              <a:latin typeface="Arial"/>
-            </a:endParaRPr>
-          </a:p>
-        </p:txBody>
-      </p:sp>
+      </p:cxnSp>
+      <p:cxnSp>
+        <p:nvCxnSpPr>
+          <p:cNvPr id="74" name="Curved Connector 73"/>
+          <p:cNvCxnSpPr>
+            <a:stCxn id="45" idx="2"/>
+            <a:endCxn id="57" idx="4"/>
+          </p:cNvCxnSpPr>
+          <p:nvPr/>
+        </p:nvCxnSpPr>
+        <p:spPr>
+          <a:xfrm rot="5400000">
+            <a:off x="1773450" y="3126870"/>
+            <a:ext cx="320400" cy="2021220"/>
+          </a:xfrm>
+          <a:prstGeom prst="curvedConnector3">
+            <a:avLst>
+              <a:gd name="adj1" fmla="val 297890"/>
+            </a:avLst>
+          </a:prstGeom>
+          <a:ln>
+            <a:tailEnd type="triangle"/>
+          </a:ln>
+        </p:spPr>
+        <p:style>
+          <a:lnRef idx="1">
+            <a:schemeClr val="dk1"/>
+          </a:lnRef>
+          <a:fillRef idx="0">
+            <a:schemeClr val="dk1"/>
+          </a:fillRef>
+          <a:effectRef idx="0">
+            <a:schemeClr val="dk1"/>
+          </a:effectRef>
+          <a:fontRef idx="minor">
+            <a:schemeClr val="tx1"/>
+          </a:fontRef>
+        </p:style>
+      </p:cxnSp>
     </p:spTree>
   </p:cSld>
+  <p:clrMapOvr>
+    <a:masterClrMapping/>
+  </p:clrMapOvr>
   <p:timing>
     <p:tnLst>
       <p:par>
@@ -3091,14 +3305,14 @@
             <p:seq>
               <p:cTn id="2" dur="indefinite" nodeType="mainSeq"/>
               <p:prevCondLst>
-                <p:cond delay="0" evt="onPrev">
+                <p:cond evt="onPrev" delay="0">
                   <p:tgtEl>
                     <p:sldTgt/>
                   </p:tgtEl>
                 </p:cond>
               </p:prevCondLst>
               <p:nextCondLst>
-                <p:cond delay="0" evt="onNext">
+                <p:cond evt="onNext" delay="0">
                   <p:tgtEl>
                     <p:sldTgt/>
                   </p:tgtEl>
@@ -3124,31 +3338,31 @@
         <a:sysClr val="window" lastClr="FFFFFF"/>
       </a:lt1>
       <a:dk2>
-        <a:srgbClr val="1f497d"/>
+        <a:srgbClr val="1F497D"/>
       </a:dk2>
       <a:lt2>
-        <a:srgbClr val="eeece1"/>
+        <a:srgbClr val="EEECE1"/>
       </a:lt2>
       <a:accent1>
-        <a:srgbClr val="4f81bd"/>
+        <a:srgbClr val="4F81BD"/>
       </a:accent1>
       <a:accent2>
-        <a:srgbClr val="c0504d"/>
+        <a:srgbClr val="C0504D"/>
       </a:accent2>
       <a:accent3>
-        <a:srgbClr val="9bbb59"/>
+        <a:srgbClr val="9BBB59"/>
       </a:accent3>
       <a:accent4>
-        <a:srgbClr val="8064a2"/>
+        <a:srgbClr val="8064A2"/>
       </a:accent4>
       <a:accent5>
-        <a:srgbClr val="4bacc6"/>
+        <a:srgbClr val="4BACC6"/>
       </a:accent5>
       <a:accent6>
-        <a:srgbClr val="f79646"/>
+        <a:srgbClr val="F79646"/>
       </a:accent6>
       <a:hlink>
-        <a:srgbClr val="0000ff"/>
+        <a:srgbClr val="0000FF"/>
       </a:hlink>
       <a:folHlink>
         <a:srgbClr val="800080"/>
@@ -3333,5 +3547,7 @@
       </a:bgFillStyleLst>
     </a:fmtScheme>
   </a:themeElements>
+  <a:objectDefaults/>
+  <a:extraClrSchemeLst/>
 </a:theme>
 </file>
</xml_diff>